<commit_message>
Created an additional ASP.NET 4 project
Custom client side validation is broken in ASPNET 5, so I just made a .v
4 project for the primary demos
</commit_message>
<xml_diff>
--- a/Slides/MVC UI Slides.pptx
+++ b/Slides/MVC UI Slides.pptx
@@ -210,7 +210,7 @@
           <a:p>
             <a:fld id="{65C92C92-0600-44E4-B8C5-BE31105EB93E}" type="datetimeFigureOut">
               <a:rPr lang="en-US" smtClean="0"/>
-              <a:t>3/22/2015</a:t>
+              <a:t>3/25/15</a:t>
             </a:fld>
             <a:endParaRPr lang="en-US"/>
           </a:p>
@@ -1433,7 +1433,7 @@
           <a:p>
             <a:fld id="{DA4A72E3-DFDF-4B5F-92BB-09FFBD549BB9}" type="datetimeFigureOut">
               <a:rPr lang="en-US" smtClean="0"/>
-              <a:t>3/22/2015</a:t>
+              <a:t>3/25/15</a:t>
             </a:fld>
             <a:endParaRPr lang="en-US"/>
           </a:p>
@@ -1494,7 +1494,7 @@
   <p:timing>
     <p:tnLst>
       <p:par>
-        <p:cTn id="1" dur="indefinite" restart="never" nodeType="tmRoot"/>
+        <p:cTn xmlns:p14="http://schemas.microsoft.com/office/powerpoint/2010/main" id="1" dur="indefinite" restart="never" nodeType="tmRoot"/>
       </p:par>
     </p:tnLst>
   </p:timing>
@@ -1610,7 +1610,7 @@
           <a:p>
             <a:fld id="{DA4A72E3-DFDF-4B5F-92BB-09FFBD549BB9}" type="datetimeFigureOut">
               <a:rPr lang="en-US" smtClean="0"/>
-              <a:t>3/22/2015</a:t>
+              <a:t>3/25/15</a:t>
             </a:fld>
             <a:endParaRPr lang="en-US"/>
           </a:p>
@@ -1790,7 +1790,7 @@
           <a:p>
             <a:fld id="{DA4A72E3-DFDF-4B5F-92BB-09FFBD549BB9}" type="datetimeFigureOut">
               <a:rPr lang="en-US" smtClean="0"/>
-              <a:t>3/22/2015</a:t>
+              <a:t>3/25/15</a:t>
             </a:fld>
             <a:endParaRPr lang="en-US"/>
           </a:p>
@@ -1993,7 +1993,7 @@
           <a:p>
             <a:fld id="{DA4A72E3-DFDF-4B5F-92BB-09FFBD549BB9}" type="datetimeFigureOut">
               <a:rPr lang="en-US" smtClean="0"/>
-              <a:t>3/22/2015</a:t>
+              <a:t>3/25/15</a:t>
             </a:fld>
             <a:endParaRPr lang="en-US"/>
           </a:p>
@@ -2163,7 +2163,7 @@
           <a:p>
             <a:fld id="{DA4A72E3-DFDF-4B5F-92BB-09FFBD549BB9}" type="datetimeFigureOut">
               <a:rPr lang="en-US" smtClean="0"/>
-              <a:t>3/22/2015</a:t>
+              <a:t>3/25/15</a:t>
             </a:fld>
             <a:endParaRPr lang="en-US"/>
           </a:p>
@@ -2414,7 +2414,7 @@
           <a:p>
             <a:fld id="{DA4A72E3-DFDF-4B5F-92BB-09FFBD549BB9}" type="datetimeFigureOut">
               <a:rPr lang="en-US" smtClean="0"/>
-              <a:t>3/22/2015</a:t>
+              <a:t>3/25/15</a:t>
             </a:fld>
             <a:endParaRPr lang="en-US"/>
           </a:p>
@@ -2646,7 +2646,7 @@
           <a:p>
             <a:fld id="{DA4A72E3-DFDF-4B5F-92BB-09FFBD549BB9}" type="datetimeFigureOut">
               <a:rPr lang="en-US" smtClean="0"/>
-              <a:t>3/22/2015</a:t>
+              <a:t>3/25/15</a:t>
             </a:fld>
             <a:endParaRPr lang="en-US"/>
           </a:p>
@@ -2993,7 +2993,7 @@
           <a:p>
             <a:fld id="{DA4A72E3-DFDF-4B5F-92BB-09FFBD549BB9}" type="datetimeFigureOut">
               <a:rPr lang="en-US" smtClean="0"/>
-              <a:t>3/22/2015</a:t>
+              <a:t>3/25/15</a:t>
             </a:fld>
             <a:endParaRPr lang="en-US"/>
           </a:p>
@@ -3111,7 +3111,7 @@
           <a:p>
             <a:fld id="{DA4A72E3-DFDF-4B5F-92BB-09FFBD549BB9}" type="datetimeFigureOut">
               <a:rPr lang="en-US" smtClean="0"/>
-              <a:t>3/22/2015</a:t>
+              <a:t>3/25/15</a:t>
             </a:fld>
             <a:endParaRPr lang="en-US"/>
           </a:p>
@@ -3229,7 +3229,7 @@
           <a:p>
             <a:fld id="{DA4A72E3-DFDF-4B5F-92BB-09FFBD549BB9}" type="datetimeFigureOut">
               <a:rPr lang="en-US" smtClean="0"/>
-              <a:t>3/22/2015</a:t>
+              <a:t>3/25/15</a:t>
             </a:fld>
             <a:endParaRPr lang="en-US"/>
           </a:p>
@@ -3513,7 +3513,7 @@
           <a:p>
             <a:fld id="{DA4A72E3-DFDF-4B5F-92BB-09FFBD549BB9}" type="datetimeFigureOut">
               <a:rPr lang="en-US" smtClean="0"/>
-              <a:t>3/22/2015</a:t>
+              <a:t>3/25/15</a:t>
             </a:fld>
             <a:endParaRPr lang="en-US"/>
           </a:p>
@@ -3683,7 +3683,7 @@
           <a:p>
             <a:fld id="{DA4A72E3-DFDF-4B5F-92BB-09FFBD549BB9}" type="datetimeFigureOut">
               <a:rPr lang="en-US" smtClean="0"/>
-              <a:t>3/22/2015</a:t>
+              <a:t>3/25/15</a:t>
             </a:fld>
             <a:endParaRPr lang="en-US"/>
           </a:p>
@@ -3744,7 +3744,7 @@
   <p:timing>
     <p:tnLst>
       <p:par>
-        <p:cTn id="1" dur="indefinite" restart="never" nodeType="tmRoot"/>
+        <p:cTn xmlns:p14="http://schemas.microsoft.com/office/powerpoint/2010/main" id="1" dur="indefinite" restart="never" nodeType="tmRoot"/>
       </p:par>
     </p:tnLst>
   </p:timing>
@@ -3954,7 +3954,7 @@
           <a:p>
             <a:fld id="{DA4A72E3-DFDF-4B5F-92BB-09FFBD549BB9}" type="datetimeFigureOut">
               <a:rPr lang="en-US" smtClean="0"/>
-              <a:t>3/22/2015</a:t>
+              <a:t>3/25/15</a:t>
             </a:fld>
             <a:endParaRPr lang="en-US"/>
           </a:p>
@@ -4124,7 +4124,7 @@
           <a:p>
             <a:fld id="{DA4A72E3-DFDF-4B5F-92BB-09FFBD549BB9}" type="datetimeFigureOut">
               <a:rPr lang="en-US" smtClean="0"/>
-              <a:t>3/22/2015</a:t>
+              <a:t>3/25/15</a:t>
             </a:fld>
             <a:endParaRPr lang="en-US"/>
           </a:p>
@@ -4304,7 +4304,7 @@
           <a:p>
             <a:fld id="{DA4A72E3-DFDF-4B5F-92BB-09FFBD549BB9}" type="datetimeFigureOut">
               <a:rPr lang="en-US" smtClean="0"/>
-              <a:t>3/22/2015</a:t>
+              <a:t>3/25/15</a:t>
             </a:fld>
             <a:endParaRPr lang="en-US"/>
           </a:p>
@@ -4507,7 +4507,7 @@
           <a:p>
             <a:fld id="{DA4A72E3-DFDF-4B5F-92BB-09FFBD549BB9}" type="datetimeFigureOut">
               <a:rPr lang="en-US" smtClean="0"/>
-              <a:t>3/22/2015</a:t>
+              <a:t>3/25/15</a:t>
             </a:fld>
             <a:endParaRPr lang="en-US"/>
           </a:p>
@@ -4677,7 +4677,7 @@
           <a:p>
             <a:fld id="{DA4A72E3-DFDF-4B5F-92BB-09FFBD549BB9}" type="datetimeFigureOut">
               <a:rPr lang="en-US" smtClean="0"/>
-              <a:t>3/22/2015</a:t>
+              <a:t>3/25/15</a:t>
             </a:fld>
             <a:endParaRPr lang="en-US"/>
           </a:p>
@@ -4928,7 +4928,7 @@
           <a:p>
             <a:fld id="{DA4A72E3-DFDF-4B5F-92BB-09FFBD549BB9}" type="datetimeFigureOut">
               <a:rPr lang="en-US" smtClean="0"/>
-              <a:t>3/22/2015</a:t>
+              <a:t>3/25/15</a:t>
             </a:fld>
             <a:endParaRPr lang="en-US"/>
           </a:p>
@@ -5160,7 +5160,7 @@
           <a:p>
             <a:fld id="{DA4A72E3-DFDF-4B5F-92BB-09FFBD549BB9}" type="datetimeFigureOut">
               <a:rPr lang="en-US" smtClean="0"/>
-              <a:t>3/22/2015</a:t>
+              <a:t>3/25/15</a:t>
             </a:fld>
             <a:endParaRPr lang="en-US"/>
           </a:p>
@@ -5507,7 +5507,7 @@
           <a:p>
             <a:fld id="{DA4A72E3-DFDF-4B5F-92BB-09FFBD549BB9}" type="datetimeFigureOut">
               <a:rPr lang="en-US" smtClean="0"/>
-              <a:t>3/22/2015</a:t>
+              <a:t>3/25/15</a:t>
             </a:fld>
             <a:endParaRPr lang="en-US"/>
           </a:p>
@@ -5625,7 +5625,7 @@
           <a:p>
             <a:fld id="{DA4A72E3-DFDF-4B5F-92BB-09FFBD549BB9}" type="datetimeFigureOut">
               <a:rPr lang="en-US" smtClean="0"/>
-              <a:t>3/22/2015</a:t>
+              <a:t>3/25/15</a:t>
             </a:fld>
             <a:endParaRPr lang="en-US"/>
           </a:p>
@@ -5743,7 +5743,7 @@
           <a:p>
             <a:fld id="{DA4A72E3-DFDF-4B5F-92BB-09FFBD549BB9}" type="datetimeFigureOut">
               <a:rPr lang="en-US" smtClean="0"/>
-              <a:t>3/22/2015</a:t>
+              <a:t>3/25/15</a:t>
             </a:fld>
             <a:endParaRPr lang="en-US"/>
           </a:p>
@@ -5994,7 +5994,7 @@
           <a:p>
             <a:fld id="{DA4A72E3-DFDF-4B5F-92BB-09FFBD549BB9}" type="datetimeFigureOut">
               <a:rPr lang="en-US" smtClean="0"/>
-              <a:t>3/22/2015</a:t>
+              <a:t>3/25/15</a:t>
             </a:fld>
             <a:endParaRPr lang="en-US"/>
           </a:p>
@@ -6278,7 +6278,7 @@
           <a:p>
             <a:fld id="{DA4A72E3-DFDF-4B5F-92BB-09FFBD549BB9}" type="datetimeFigureOut">
               <a:rPr lang="en-US" smtClean="0"/>
-              <a:t>3/22/2015</a:t>
+              <a:t>3/25/15</a:t>
             </a:fld>
             <a:endParaRPr lang="en-US"/>
           </a:p>
@@ -6542,7 +6542,7 @@
           <a:p>
             <a:fld id="{DA4A72E3-DFDF-4B5F-92BB-09FFBD549BB9}" type="datetimeFigureOut">
               <a:rPr lang="en-US" smtClean="0"/>
-              <a:t>3/22/2015</a:t>
+              <a:t>3/25/15</a:t>
             </a:fld>
             <a:endParaRPr lang="en-US"/>
           </a:p>
@@ -6712,7 +6712,7 @@
           <a:p>
             <a:fld id="{DA4A72E3-DFDF-4B5F-92BB-09FFBD549BB9}" type="datetimeFigureOut">
               <a:rPr lang="en-US" smtClean="0"/>
-              <a:t>3/22/2015</a:t>
+              <a:t>3/25/15</a:t>
             </a:fld>
             <a:endParaRPr lang="en-US"/>
           </a:p>
@@ -6892,7 +6892,7 @@
           <a:p>
             <a:fld id="{DA4A72E3-DFDF-4B5F-92BB-09FFBD549BB9}" type="datetimeFigureOut">
               <a:rPr lang="en-US" smtClean="0"/>
-              <a:t>3/22/2015</a:t>
+              <a:t>3/25/15</a:t>
             </a:fld>
             <a:endParaRPr lang="en-US"/>
           </a:p>
@@ -7095,7 +7095,7 @@
           <a:p>
             <a:fld id="{DA4A72E3-DFDF-4B5F-92BB-09FFBD549BB9}" type="datetimeFigureOut">
               <a:rPr lang="en-US" smtClean="0"/>
-              <a:t>3/22/2015</a:t>
+              <a:t>3/25/15</a:t>
             </a:fld>
             <a:endParaRPr lang="en-US"/>
           </a:p>
@@ -7265,7 +7265,7 @@
           <a:p>
             <a:fld id="{DA4A72E3-DFDF-4B5F-92BB-09FFBD549BB9}" type="datetimeFigureOut">
               <a:rPr lang="en-US" smtClean="0"/>
-              <a:t>3/22/2015</a:t>
+              <a:t>3/25/15</a:t>
             </a:fld>
             <a:endParaRPr lang="en-US"/>
           </a:p>
@@ -7516,7 +7516,7 @@
           <a:p>
             <a:fld id="{DA4A72E3-DFDF-4B5F-92BB-09FFBD549BB9}" type="datetimeFigureOut">
               <a:rPr lang="en-US" smtClean="0"/>
-              <a:t>3/22/2015</a:t>
+              <a:t>3/25/15</a:t>
             </a:fld>
             <a:endParaRPr lang="en-US"/>
           </a:p>
@@ -7748,7 +7748,7 @@
           <a:p>
             <a:fld id="{DA4A72E3-DFDF-4B5F-92BB-09FFBD549BB9}" type="datetimeFigureOut">
               <a:rPr lang="en-US" smtClean="0"/>
-              <a:t>3/22/2015</a:t>
+              <a:t>3/25/15</a:t>
             </a:fld>
             <a:endParaRPr lang="en-US"/>
           </a:p>
@@ -8095,7 +8095,7 @@
           <a:p>
             <a:fld id="{DA4A72E3-DFDF-4B5F-92BB-09FFBD549BB9}" type="datetimeFigureOut">
               <a:rPr lang="en-US" smtClean="0"/>
-              <a:t>3/22/2015</a:t>
+              <a:t>3/25/15</a:t>
             </a:fld>
             <a:endParaRPr lang="en-US"/>
           </a:p>
@@ -8213,7 +8213,7 @@
           <a:p>
             <a:fld id="{DA4A72E3-DFDF-4B5F-92BB-09FFBD549BB9}" type="datetimeFigureOut">
               <a:rPr lang="en-US" smtClean="0"/>
-              <a:t>3/22/2015</a:t>
+              <a:t>3/25/15</a:t>
             </a:fld>
             <a:endParaRPr lang="en-US"/>
           </a:p>
@@ -8468,7 +8468,7 @@
           <a:p>
             <a:fld id="{DA4A72E3-DFDF-4B5F-92BB-09FFBD549BB9}" type="datetimeFigureOut">
               <a:rPr lang="en-US" smtClean="0"/>
-              <a:t>3/22/2015</a:t>
+              <a:t>3/25/15</a:t>
             </a:fld>
             <a:endParaRPr lang="en-US"/>
           </a:p>
@@ -8563,7 +8563,7 @@
           <a:p>
             <a:fld id="{DA4A72E3-DFDF-4B5F-92BB-09FFBD549BB9}" type="datetimeFigureOut">
               <a:rPr lang="en-US" smtClean="0"/>
-              <a:t>3/22/2015</a:t>
+              <a:t>3/25/15</a:t>
             </a:fld>
             <a:endParaRPr lang="en-US"/>
           </a:p>
@@ -8847,7 +8847,7 @@
           <a:p>
             <a:fld id="{DA4A72E3-DFDF-4B5F-92BB-09FFBD549BB9}" type="datetimeFigureOut">
               <a:rPr lang="en-US" smtClean="0"/>
-              <a:t>3/22/2015</a:t>
+              <a:t>3/25/15</a:t>
             </a:fld>
             <a:endParaRPr lang="en-US"/>
           </a:p>
@@ -9111,7 +9111,7 @@
           <a:p>
             <a:fld id="{DA4A72E3-DFDF-4B5F-92BB-09FFBD549BB9}" type="datetimeFigureOut">
               <a:rPr lang="en-US" smtClean="0"/>
-              <a:t>3/22/2015</a:t>
+              <a:t>3/25/15</a:t>
             </a:fld>
             <a:endParaRPr lang="en-US"/>
           </a:p>
@@ -9281,7 +9281,7 @@
           <a:p>
             <a:fld id="{DA4A72E3-DFDF-4B5F-92BB-09FFBD549BB9}" type="datetimeFigureOut">
               <a:rPr lang="en-US" smtClean="0"/>
-              <a:t>3/22/2015</a:t>
+              <a:t>3/25/15</a:t>
             </a:fld>
             <a:endParaRPr lang="en-US"/>
           </a:p>
@@ -9461,7 +9461,7 @@
           <a:p>
             <a:fld id="{DA4A72E3-DFDF-4B5F-92BB-09FFBD549BB9}" type="datetimeFigureOut">
               <a:rPr lang="en-US" smtClean="0"/>
-              <a:t>3/22/2015</a:t>
+              <a:t>3/25/15</a:t>
             </a:fld>
             <a:endParaRPr lang="en-US"/>
           </a:p>
@@ -9664,7 +9664,7 @@
           <a:p>
             <a:fld id="{DA4A72E3-DFDF-4B5F-92BB-09FFBD549BB9}" type="datetimeFigureOut">
               <a:rPr lang="en-US" smtClean="0"/>
-              <a:t>3/22/2015</a:t>
+              <a:t>3/25/15</a:t>
             </a:fld>
             <a:endParaRPr lang="en-US"/>
           </a:p>
@@ -9834,7 +9834,7 @@
           <a:p>
             <a:fld id="{DA4A72E3-DFDF-4B5F-92BB-09FFBD549BB9}" type="datetimeFigureOut">
               <a:rPr lang="en-US" smtClean="0"/>
-              <a:t>3/22/2015</a:t>
+              <a:t>3/25/15</a:t>
             </a:fld>
             <a:endParaRPr lang="en-US"/>
           </a:p>
@@ -10085,7 +10085,7 @@
           <a:p>
             <a:fld id="{DA4A72E3-DFDF-4B5F-92BB-09FFBD549BB9}" type="datetimeFigureOut">
               <a:rPr lang="en-US" smtClean="0"/>
-              <a:t>3/22/2015</a:t>
+              <a:t>3/25/15</a:t>
             </a:fld>
             <a:endParaRPr lang="en-US"/>
           </a:p>
@@ -10317,7 +10317,7 @@
           <a:p>
             <a:fld id="{DA4A72E3-DFDF-4B5F-92BB-09FFBD549BB9}" type="datetimeFigureOut">
               <a:rPr lang="en-US" smtClean="0"/>
-              <a:t>3/22/2015</a:t>
+              <a:t>3/25/15</a:t>
             </a:fld>
             <a:endParaRPr lang="en-US"/>
           </a:p>
@@ -10664,7 +10664,7 @@
           <a:p>
             <a:fld id="{DA4A72E3-DFDF-4B5F-92BB-09FFBD549BB9}" type="datetimeFigureOut">
               <a:rPr lang="en-US" smtClean="0"/>
-              <a:t>3/22/2015</a:t>
+              <a:t>3/25/15</a:t>
             </a:fld>
             <a:endParaRPr lang="en-US"/>
           </a:p>
@@ -11034,7 +11034,7 @@
           <a:p>
             <a:fld id="{DA4A72E3-DFDF-4B5F-92BB-09FFBD549BB9}" type="datetimeFigureOut">
               <a:rPr lang="en-US" smtClean="0"/>
-              <a:t>3/22/2015</a:t>
+              <a:t>3/25/15</a:t>
             </a:fld>
             <a:endParaRPr lang="en-US"/>
           </a:p>
@@ -11152,7 +11152,7 @@
           <a:p>
             <a:fld id="{DA4A72E3-DFDF-4B5F-92BB-09FFBD549BB9}" type="datetimeFigureOut">
               <a:rPr lang="en-US" smtClean="0"/>
-              <a:t>3/22/2015</a:t>
+              <a:t>3/25/15</a:t>
             </a:fld>
             <a:endParaRPr lang="en-US"/>
           </a:p>
@@ -11270,7 +11270,7 @@
           <a:p>
             <a:fld id="{DA4A72E3-DFDF-4B5F-92BB-09FFBD549BB9}" type="datetimeFigureOut">
               <a:rPr lang="en-US" smtClean="0"/>
-              <a:t>3/22/2015</a:t>
+              <a:t>3/25/15</a:t>
             </a:fld>
             <a:endParaRPr lang="en-US"/>
           </a:p>
@@ -11554,7 +11554,7 @@
           <a:p>
             <a:fld id="{DA4A72E3-DFDF-4B5F-92BB-09FFBD549BB9}" type="datetimeFigureOut">
               <a:rPr lang="en-US" smtClean="0"/>
-              <a:t>3/22/2015</a:t>
+              <a:t>3/25/15</a:t>
             </a:fld>
             <a:endParaRPr lang="en-US"/>
           </a:p>
@@ -11818,7 +11818,7 @@
           <a:p>
             <a:fld id="{DA4A72E3-DFDF-4B5F-92BB-09FFBD549BB9}" type="datetimeFigureOut">
               <a:rPr lang="en-US" smtClean="0"/>
-              <a:t>3/22/2015</a:t>
+              <a:t>3/25/15</a:t>
             </a:fld>
             <a:endParaRPr lang="en-US"/>
           </a:p>
@@ -11988,7 +11988,7 @@
           <a:p>
             <a:fld id="{DA4A72E3-DFDF-4B5F-92BB-09FFBD549BB9}" type="datetimeFigureOut">
               <a:rPr lang="en-US" smtClean="0"/>
-              <a:t>3/22/2015</a:t>
+              <a:t>3/25/15</a:t>
             </a:fld>
             <a:endParaRPr lang="en-US"/>
           </a:p>
@@ -12168,7 +12168,7 @@
           <a:p>
             <a:fld id="{DA4A72E3-DFDF-4B5F-92BB-09FFBD549BB9}" type="datetimeFigureOut">
               <a:rPr lang="en-US" smtClean="0"/>
-              <a:t>3/22/2015</a:t>
+              <a:t>3/25/15</a:t>
             </a:fld>
             <a:endParaRPr lang="en-US"/>
           </a:p>
@@ -12263,7 +12263,7 @@
           <a:p>
             <a:fld id="{DA4A72E3-DFDF-4B5F-92BB-09FFBD549BB9}" type="datetimeFigureOut">
               <a:rPr lang="en-US" smtClean="0"/>
-              <a:t>3/22/2015</a:t>
+              <a:t>3/25/15</a:t>
             </a:fld>
             <a:endParaRPr lang="en-US"/>
           </a:p>
@@ -12381,7 +12381,7 @@
           <a:p>
             <a:fld id="{DA4A72E3-DFDF-4B5F-92BB-09FFBD549BB9}" type="datetimeFigureOut">
               <a:rPr lang="en-US" smtClean="0"/>
-              <a:t>3/22/2015</a:t>
+              <a:t>3/25/15</a:t>
             </a:fld>
             <a:endParaRPr lang="en-US"/>
           </a:p>
@@ -12665,7 +12665,7 @@
           <a:p>
             <a:fld id="{DA4A72E3-DFDF-4B5F-92BB-09FFBD549BB9}" type="datetimeFigureOut">
               <a:rPr lang="en-US" smtClean="0"/>
-              <a:t>3/22/2015</a:t>
+              <a:t>3/25/15</a:t>
             </a:fld>
             <a:endParaRPr lang="en-US"/>
           </a:p>
@@ -12929,7 +12929,7 @@
           <a:p>
             <a:fld id="{DA4A72E3-DFDF-4B5F-92BB-09FFBD549BB9}" type="datetimeFigureOut">
               <a:rPr lang="en-US" smtClean="0"/>
-              <a:t>3/22/2015</a:t>
+              <a:t>3/25/15</a:t>
             </a:fld>
             <a:endParaRPr lang="en-US"/>
           </a:p>
@@ -13148,7 +13148,7 @@
           <a:p>
             <a:fld id="{DA4A72E3-DFDF-4B5F-92BB-09FFBD549BB9}" type="datetimeFigureOut">
               <a:rPr lang="en-US" smtClean="0"/>
-              <a:t>3/22/2015</a:t>
+              <a:t>3/25/15</a:t>
             </a:fld>
             <a:endParaRPr lang="en-US"/>
           </a:p>
@@ -13257,7 +13257,7 @@
   <p:timing>
     <p:tnLst>
       <p:par>
-        <p:cTn id="1" dur="indefinite" restart="never" nodeType="tmRoot"/>
+        <p:cTn xmlns:p14="http://schemas.microsoft.com/office/powerpoint/2010/main" id="1" dur="indefinite" restart="never" nodeType="tmRoot"/>
       </p:par>
     </p:tnLst>
   </p:timing>
@@ -13685,7 +13685,7 @@
           <a:p>
             <a:fld id="{DA4A72E3-DFDF-4B5F-92BB-09FFBD549BB9}" type="datetimeFigureOut">
               <a:rPr lang="en-US" smtClean="0"/>
-              <a:t>3/22/2015</a:t>
+              <a:t>3/25/15</a:t>
             </a:fld>
             <a:endParaRPr lang="en-US"/>
           </a:p>
@@ -14215,7 +14215,7 @@
           <a:p>
             <a:fld id="{DA4A72E3-DFDF-4B5F-92BB-09FFBD549BB9}" type="datetimeFigureOut">
               <a:rPr lang="en-US" smtClean="0"/>
-              <a:t>3/22/2015</a:t>
+              <a:t>3/25/15</a:t>
             </a:fld>
             <a:endParaRPr lang="en-US"/>
           </a:p>
@@ -14745,7 +14745,7 @@
           <a:p>
             <a:fld id="{DA4A72E3-DFDF-4B5F-92BB-09FFBD549BB9}" type="datetimeFigureOut">
               <a:rPr lang="en-US" smtClean="0"/>
-              <a:t>3/22/2015</a:t>
+              <a:t>3/25/15</a:t>
             </a:fld>
             <a:endParaRPr lang="en-US"/>
           </a:p>
@@ -15275,7 +15275,7 @@
           <a:p>
             <a:fld id="{DA4A72E3-DFDF-4B5F-92BB-09FFBD549BB9}" type="datetimeFigureOut">
               <a:rPr lang="en-US" smtClean="0"/>
-              <a:t>3/22/2015</a:t>
+              <a:t>3/25/15</a:t>
             </a:fld>
             <a:endParaRPr lang="en-US"/>
           </a:p>
@@ -15847,7 +15847,7 @@
   <p:timing>
     <p:tnLst>
       <p:par>
-        <p:cTn id="1" dur="indefinite" restart="never" nodeType="tmRoot"/>
+        <p:cTn xmlns:p14="http://schemas.microsoft.com/office/powerpoint/2010/main" id="1" dur="indefinite" restart="never" nodeType="tmRoot"/>
       </p:par>
     </p:tnLst>
   </p:timing>
@@ -15927,8 +15927,12 @@
           </a:p>
           <a:p>
             <a:r>
+              <a:rPr lang="en-US" smtClean="0"/>
+              <a:t>Conceptually similar</a:t>
+            </a:r>
+            <a:r>
               <a:rPr lang="en-US" dirty="0" smtClean="0"/>
-              <a:t>Conceptually Similar, but there’s lot of changes.</a:t>
+              <a:t>, but there’s lot of changes.</a:t>
             </a:r>
           </a:p>
           <a:p>
@@ -15955,7 +15959,7 @@
   <p:timing>
     <p:tnLst>
       <p:par>
-        <p:cTn id="1" dur="indefinite" restart="never" nodeType="tmRoot"/>
+        <p:cTn xmlns:p14="http://schemas.microsoft.com/office/powerpoint/2010/main" id="1" dur="indefinite" restart="never" nodeType="tmRoot"/>
       </p:par>
     </p:tnLst>
   </p:timing>
@@ -16034,7 +16038,7 @@
           </a:prstGeom>
           <a:noFill/>
           <a:extLst>
-            <a:ext uri="{909E8E84-426E-40DD-AFC4-6F175D3DCCD1}">
+            <a:ext uri="{909E8E84-426E-40dd-AFC4-6F175D3DCCD1}">
               <a14:hiddenFill xmlns:a14="http://schemas.microsoft.com/office/drawing/2010/main">
                 <a:solidFill>
                   <a:srgbClr val="FFFFFF"/>
@@ -16057,7 +16061,7 @@
   <p:timing>
     <p:tnLst>
       <p:par>
-        <p:cTn id="1" dur="indefinite" restart="never" nodeType="tmRoot"/>
+        <p:cTn xmlns:p14="http://schemas.microsoft.com/office/powerpoint/2010/main" id="1" dur="indefinite" restart="never" nodeType="tmRoot"/>
       </p:par>
     </p:tnLst>
   </p:timing>
@@ -16249,7 +16253,7 @@
           </a:prstGeom>
           <a:noFill/>
           <a:extLst>
-            <a:ext uri="{909E8E84-426E-40DD-AFC4-6F175D3DCCD1}">
+            <a:ext uri="{909E8E84-426E-40dd-AFC4-6F175D3DCCD1}">
               <a14:hiddenFill xmlns:a14="http://schemas.microsoft.com/office/drawing/2010/main">
                 <a:solidFill>
                   <a:srgbClr val="FFFFFF"/>
@@ -16272,7 +16276,7 @@
   <p:timing>
     <p:tnLst>
       <p:par>
-        <p:cTn id="1" dur="indefinite" restart="never" nodeType="tmRoot"/>
+        <p:cTn xmlns:p14="http://schemas.microsoft.com/office/powerpoint/2010/main" id="1" dur="indefinite" restart="never" nodeType="tmRoot"/>
       </p:par>
     </p:tnLst>
   </p:timing>
@@ -16390,7 +16394,7 @@
   <p:timing>
     <p:tnLst>
       <p:par>
-        <p:cTn id="1" dur="indefinite" restart="never" nodeType="tmRoot"/>
+        <p:cTn xmlns:p14="http://schemas.microsoft.com/office/powerpoint/2010/main" id="1" dur="indefinite" restart="never" nodeType="tmRoot"/>
       </p:par>
     </p:tnLst>
   </p:timing>
@@ -16606,7 +16610,7 @@
   <p:timing>
     <p:tnLst>
       <p:par>
-        <p:cTn id="1" dur="indefinite" restart="never" nodeType="tmRoot"/>
+        <p:cTn xmlns:p14="http://schemas.microsoft.com/office/powerpoint/2010/main" id="1" dur="indefinite" restart="never" nodeType="tmRoot"/>
       </p:par>
     </p:tnLst>
   </p:timing>
@@ -16695,7 +16699,7 @@
   <p:timing>
     <p:tnLst>
       <p:par>
-        <p:cTn id="1" dur="indefinite" restart="never" nodeType="tmRoot"/>
+        <p:cTn xmlns:p14="http://schemas.microsoft.com/office/powerpoint/2010/main" id="1" dur="indefinite" restart="never" nodeType="tmRoot"/>
       </p:par>
     </p:tnLst>
   </p:timing>
@@ -16822,7 +16826,7 @@
           </a:prstGeom>
           <a:noFill/>
           <a:extLst>
-            <a:ext uri="{909E8E84-426E-40DD-AFC4-6F175D3DCCD1}">
+            <a:ext uri="{909E8E84-426E-40dd-AFC4-6F175D3DCCD1}">
               <a14:hiddenFill xmlns:a14="http://schemas.microsoft.com/office/drawing/2010/main">
                 <a:solidFill>
                   <a:srgbClr val="FFFFFF"/>
@@ -16881,7 +16885,7 @@
   <p:timing>
     <p:tnLst>
       <p:par>
-        <p:cTn id="1" dur="indefinite" restart="never" nodeType="tmRoot"/>
+        <p:cTn xmlns:p14="http://schemas.microsoft.com/office/powerpoint/2010/main" id="1" dur="indefinite" restart="never" nodeType="tmRoot"/>
       </p:par>
     </p:tnLst>
   </p:timing>
@@ -16936,7 +16940,7 @@
           </a:prstGeom>
           <a:noFill/>
           <a:extLst>
-            <a:ext uri="{909E8E84-426E-40DD-AFC4-6F175D3DCCD1}">
+            <a:ext uri="{909E8E84-426E-40dd-AFC4-6F175D3DCCD1}">
               <a14:hiddenFill xmlns:a14="http://schemas.microsoft.com/office/drawing/2010/main">
                 <a:solidFill>
                   <a:srgbClr val="FFFFFF"/>
@@ -16996,7 +17000,7 @@
   <p:timing>
     <p:tnLst>
       <p:par>
-        <p:cTn id="1" dur="indefinite" restart="never" nodeType="tmRoot"/>
+        <p:cTn xmlns:p14="http://schemas.microsoft.com/office/powerpoint/2010/main" id="1" dur="indefinite" restart="never" nodeType="tmRoot"/>
       </p:par>
     </p:tnLst>
   </p:timing>
@@ -17082,7 +17086,7 @@
   <p:timing>
     <p:tnLst>
       <p:par>
-        <p:cTn id="1" dur="indefinite" restart="never" nodeType="tmRoot"/>
+        <p:cTn xmlns:p14="http://schemas.microsoft.com/office/powerpoint/2010/main" id="1" dur="indefinite" restart="never" nodeType="tmRoot"/>
       </p:par>
     </p:tnLst>
   </p:timing>
@@ -17282,7 +17286,7 @@
           </a:prstGeom>
           <a:noFill/>
           <a:extLst>
-            <a:ext uri="{909E8E84-426E-40DD-AFC4-6F175D3DCCD1}">
+            <a:ext uri="{909E8E84-426E-40dd-AFC4-6F175D3DCCD1}">
               <a14:hiddenFill xmlns:a14="http://schemas.microsoft.com/office/drawing/2010/main">
                 <a:solidFill>
                   <a:srgbClr val="FFFFFF"/>
@@ -17305,7 +17309,7 @@
   <p:timing>
     <p:tnLst>
       <p:par>
-        <p:cTn id="1" dur="indefinite" restart="never" nodeType="tmRoot"/>
+        <p:cTn xmlns:p14="http://schemas.microsoft.com/office/powerpoint/2010/main" id="1" dur="indefinite" restart="never" nodeType="tmRoot"/>
       </p:par>
     </p:tnLst>
   </p:timing>
@@ -17398,7 +17402,7 @@
   <p:timing>
     <p:tnLst>
       <p:par>
-        <p:cTn id="1" dur="indefinite" restart="never" nodeType="tmRoot"/>
+        <p:cTn xmlns:p14="http://schemas.microsoft.com/office/powerpoint/2010/main" id="1" dur="indefinite" restart="never" nodeType="tmRoot"/>
       </p:par>
     </p:tnLst>
   </p:timing>
@@ -17484,8 +17488,18 @@
           </a:p>
           <a:p>
             <a:r>
+              <a:rPr lang="en-US" dirty="0" smtClean="0"/>
+              <a:t>Higher Quality Code</a:t>
+            </a:r>
+          </a:p>
+          <a:p>
+            <a:r>
+              <a:rPr lang="en-US" dirty="0" smtClean="0"/>
+              <a:t>Not </a:t>
+            </a:r>
+            <a:r>
               <a:rPr lang="en-US" dirty="0"/>
-              <a:t>Not to have to change the code in 100 different places because </a:t>
+              <a:t>to have to change the code in 100 different places because </a:t>
             </a:r>
             <a:r>
               <a:rPr lang="en-US" dirty="0" smtClean="0"/>
@@ -17523,7 +17537,7 @@
   <p:timing>
     <p:tnLst>
       <p:par>
-        <p:cTn id="1" dur="indefinite" restart="never" nodeType="tmRoot"/>
+        <p:cTn xmlns:p14="http://schemas.microsoft.com/office/powerpoint/2010/main" id="1" dur="indefinite" restart="never" nodeType="tmRoot"/>
       </p:par>
     </p:tnLst>
   </p:timing>
@@ -17578,7 +17592,7 @@
           </a:prstGeom>
           <a:noFill/>
           <a:extLst>
-            <a:ext uri="{909E8E84-426E-40DD-AFC4-6F175D3DCCD1}">
+            <a:ext uri="{909E8E84-426E-40dd-AFC4-6F175D3DCCD1}">
               <a14:hiddenFill xmlns:a14="http://schemas.microsoft.com/office/drawing/2010/main">
                 <a:solidFill>
                   <a:srgbClr val="FFFFFF"/>
@@ -17668,7 +17682,7 @@
   <p:timing>
     <p:tnLst>
       <p:par>
-        <p:cTn id="1" dur="indefinite" restart="never" nodeType="tmRoot"/>
+        <p:cTn xmlns:p14="http://schemas.microsoft.com/office/powerpoint/2010/main" id="1" dur="indefinite" restart="never" nodeType="tmRoot"/>
       </p:par>
     </p:tnLst>
   </p:timing>
@@ -17751,7 +17765,7 @@
   <p:timing>
     <p:tnLst>
       <p:par>
-        <p:cTn id="1" dur="indefinite" restart="never" nodeType="tmRoot"/>
+        <p:cTn xmlns:p14="http://schemas.microsoft.com/office/powerpoint/2010/main" id="1" dur="indefinite" restart="never" nodeType="tmRoot"/>
       </p:par>
     </p:tnLst>
   </p:timing>
@@ -19006,7 +19020,7 @@
     </a:clrScheme>
     <a:fontScheme name="Office">
       <a:majorFont>
-        <a:latin typeface="Calibri Light" panose="020F0302020204030204"/>
+        <a:latin typeface="Calibri Light"/>
         <a:ea typeface=""/>
         <a:cs typeface=""/>
         <a:font script="Jpan" typeface="ＭＳ Ｐゴシック"/>
@@ -19041,7 +19055,7 @@
         <a:font script="Geor" typeface="Sylfaen"/>
       </a:majorFont>
       <a:minorFont>
-        <a:latin typeface="Calibri" panose="020F0502020204030204"/>
+        <a:latin typeface="Calibri"/>
         <a:ea typeface=""/>
         <a:cs typeface=""/>
         <a:font script="Jpan" typeface="ＭＳ Ｐゴシック"/>
@@ -19218,7 +19232,7 @@
   <a:extraClrSchemeLst/>
   <a:extLst>
     <a:ext uri="{05A4C25C-085E-4340-85A3-A5531E510DB2}">
-      <thm15:themeFamily xmlns:thm15="http://schemas.microsoft.com/office/thememl/2012/main" name="Office Theme" id="{62F939B6-93AF-4DB8-9C6B-D6C7DFDC589F}" vid="{4A3C46E8-61CC-4603-A589-7422A47A8E4A}"/>
+      <thm15:themeFamily xmlns="" xmlns:thm15="http://schemas.microsoft.com/office/thememl/2012/main" name="Office Theme" id="{62F939B6-93AF-4DB8-9C6B-D6C7DFDC589F}" vid="{4A3C46E8-61CC-4603-A589-7422A47A8E4A}"/>
     </a:ext>
   </a:extLst>
 </a:theme>

</xml_diff>

<commit_message>
Minor fixes and updates
</commit_message>
<xml_diff>
--- a/Slides/MVC UI Slides.pptx
+++ b/Slides/MVC UI Slides.pptx
@@ -210,7 +210,7 @@
           <a:p>
             <a:fld id="{65C92C92-0600-44E4-B8C5-BE31105EB93E}" type="datetimeFigureOut">
               <a:rPr lang="en-US" smtClean="0"/>
-              <a:t>3/25/15</a:t>
+              <a:t>3/26/15</a:t>
             </a:fld>
             <a:endParaRPr lang="en-US"/>
           </a:p>
@@ -1231,6 +1231,114 @@
           <a:p>
             <a:r>
               <a:rPr lang="en-US" dirty="0" smtClean="0"/>
+              <a:t>Gauge the audience’s experience with ASP.NET</a:t>
+            </a:r>
+            <a:r>
+              <a:rPr lang="en-US" baseline="0" dirty="0" smtClean="0"/>
+              <a:t> MVC</a:t>
+            </a:r>
+          </a:p>
+          <a:p>
+            <a:endParaRPr lang="en-US" baseline="0" dirty="0" smtClean="0"/>
+          </a:p>
+          <a:p>
+            <a:r>
+              <a:rPr lang="en-US" baseline="0" smtClean="0"/>
+              <a:t>See </a:t>
+            </a:r>
+            <a:r>
+              <a:rPr lang="en-US" baseline="0" dirty="0" smtClean="0"/>
+              <a:t>what people are doing </a:t>
+            </a:r>
+            <a:r>
+              <a:rPr lang="en-US" baseline="0" smtClean="0"/>
+              <a:t>with it. </a:t>
+            </a:r>
+          </a:p>
+        </p:txBody>
+      </p:sp>
+      <p:sp>
+        <p:nvSpPr>
+          <p:cNvPr id="4" name="Slide Number Placeholder 3"/>
+          <p:cNvSpPr>
+            <a:spLocks noGrp="1"/>
+          </p:cNvSpPr>
+          <p:nvPr>
+            <p:ph type="sldNum" sz="quarter" idx="10"/>
+          </p:nvPr>
+        </p:nvSpPr>
+        <p:spPr/>
+        <p:txBody>
+          <a:bodyPr/>
+          <a:lstStyle/>
+          <a:p>
+            <a:fld id="{8379EAB3-DC98-4B09-BD7D-31DCCB97D8F1}" type="slidenum">
+              <a:rPr lang="en-US" smtClean="0"/>
+              <a:t>9</a:t>
+            </a:fld>
+            <a:endParaRPr lang="en-US"/>
+          </a:p>
+        </p:txBody>
+      </p:sp>
+    </p:spTree>
+    <p:extLst>
+      <p:ext uri="{BB962C8B-B14F-4D97-AF65-F5344CB8AC3E}">
+        <p14:creationId xmlns:p14="http://schemas.microsoft.com/office/powerpoint/2010/main" val="2258679237"/>
+      </p:ext>
+    </p:extLst>
+  </p:cSld>
+  <p:clrMapOvr>
+    <a:masterClrMapping/>
+  </p:clrMapOvr>
+</p:notes>
+</file>
+
+<file path=ppt/notesSlides/notesSlide7.xml><?xml version="1.0" encoding="utf-8"?>
+<p:notes xmlns:a="http://schemas.openxmlformats.org/drawingml/2006/main" xmlns:r="http://schemas.openxmlformats.org/officeDocument/2006/relationships" xmlns:p="http://schemas.openxmlformats.org/presentationml/2006/main">
+  <p:cSld>
+    <p:spTree>
+      <p:nvGrpSpPr>
+        <p:cNvPr id="1" name=""/>
+        <p:cNvGrpSpPr/>
+        <p:nvPr/>
+      </p:nvGrpSpPr>
+      <p:grpSpPr>
+        <a:xfrm>
+          <a:off x="0" y="0"/>
+          <a:ext cx="0" cy="0"/>
+          <a:chOff x="0" y="0"/>
+          <a:chExt cx="0" cy="0"/>
+        </a:xfrm>
+      </p:grpSpPr>
+      <p:sp>
+        <p:nvSpPr>
+          <p:cNvPr id="2" name="Slide Image Placeholder 1"/>
+          <p:cNvSpPr>
+            <a:spLocks noGrp="1" noRot="1" noChangeAspect="1"/>
+          </p:cNvSpPr>
+          <p:nvPr>
+            <p:ph type="sldImg"/>
+          </p:nvPr>
+        </p:nvSpPr>
+        <p:spPr/>
+      </p:sp>
+      <p:sp>
+        <p:nvSpPr>
+          <p:cNvPr id="3" name="Notes Placeholder 2"/>
+          <p:cNvSpPr>
+            <a:spLocks noGrp="1"/>
+          </p:cNvSpPr>
+          <p:nvPr>
+            <p:ph type="body" idx="1"/>
+          </p:nvPr>
+        </p:nvSpPr>
+        <p:spPr/>
+        <p:txBody>
+          <a:bodyPr/>
+          <a:lstStyle/>
+          <a:p>
+            <a:r>
+              <a:rPr lang="en-US" dirty="0" smtClean="0"/>
               <a:t>ASP.NET MVC 6</a:t>
             </a:r>
             <a:r>
@@ -1433,7 +1541,7 @@
           <a:p>
             <a:fld id="{DA4A72E3-DFDF-4B5F-92BB-09FFBD549BB9}" type="datetimeFigureOut">
               <a:rPr lang="en-US" smtClean="0"/>
-              <a:t>3/25/15</a:t>
+              <a:t>3/26/15</a:t>
             </a:fld>
             <a:endParaRPr lang="en-US"/>
           </a:p>
@@ -1610,7 +1718,7 @@
           <a:p>
             <a:fld id="{DA4A72E3-DFDF-4B5F-92BB-09FFBD549BB9}" type="datetimeFigureOut">
               <a:rPr lang="en-US" smtClean="0"/>
-              <a:t>3/25/15</a:t>
+              <a:t>3/26/15</a:t>
             </a:fld>
             <a:endParaRPr lang="en-US"/>
           </a:p>
@@ -1790,7 +1898,7 @@
           <a:p>
             <a:fld id="{DA4A72E3-DFDF-4B5F-92BB-09FFBD549BB9}" type="datetimeFigureOut">
               <a:rPr lang="en-US" smtClean="0"/>
-              <a:t>3/25/15</a:t>
+              <a:t>3/26/15</a:t>
             </a:fld>
             <a:endParaRPr lang="en-US"/>
           </a:p>
@@ -1993,7 +2101,7 @@
           <a:p>
             <a:fld id="{DA4A72E3-DFDF-4B5F-92BB-09FFBD549BB9}" type="datetimeFigureOut">
               <a:rPr lang="en-US" smtClean="0"/>
-              <a:t>3/25/15</a:t>
+              <a:t>3/26/15</a:t>
             </a:fld>
             <a:endParaRPr lang="en-US"/>
           </a:p>
@@ -2163,7 +2271,7 @@
           <a:p>
             <a:fld id="{DA4A72E3-DFDF-4B5F-92BB-09FFBD549BB9}" type="datetimeFigureOut">
               <a:rPr lang="en-US" smtClean="0"/>
-              <a:t>3/25/15</a:t>
+              <a:t>3/26/15</a:t>
             </a:fld>
             <a:endParaRPr lang="en-US"/>
           </a:p>
@@ -2414,7 +2522,7 @@
           <a:p>
             <a:fld id="{DA4A72E3-DFDF-4B5F-92BB-09FFBD549BB9}" type="datetimeFigureOut">
               <a:rPr lang="en-US" smtClean="0"/>
-              <a:t>3/25/15</a:t>
+              <a:t>3/26/15</a:t>
             </a:fld>
             <a:endParaRPr lang="en-US"/>
           </a:p>
@@ -2646,7 +2754,7 @@
           <a:p>
             <a:fld id="{DA4A72E3-DFDF-4B5F-92BB-09FFBD549BB9}" type="datetimeFigureOut">
               <a:rPr lang="en-US" smtClean="0"/>
-              <a:t>3/25/15</a:t>
+              <a:t>3/26/15</a:t>
             </a:fld>
             <a:endParaRPr lang="en-US"/>
           </a:p>
@@ -2993,7 +3101,7 @@
           <a:p>
             <a:fld id="{DA4A72E3-DFDF-4B5F-92BB-09FFBD549BB9}" type="datetimeFigureOut">
               <a:rPr lang="en-US" smtClean="0"/>
-              <a:t>3/25/15</a:t>
+              <a:t>3/26/15</a:t>
             </a:fld>
             <a:endParaRPr lang="en-US"/>
           </a:p>
@@ -3111,7 +3219,7 @@
           <a:p>
             <a:fld id="{DA4A72E3-DFDF-4B5F-92BB-09FFBD549BB9}" type="datetimeFigureOut">
               <a:rPr lang="en-US" smtClean="0"/>
-              <a:t>3/25/15</a:t>
+              <a:t>3/26/15</a:t>
             </a:fld>
             <a:endParaRPr lang="en-US"/>
           </a:p>
@@ -3229,7 +3337,7 @@
           <a:p>
             <a:fld id="{DA4A72E3-DFDF-4B5F-92BB-09FFBD549BB9}" type="datetimeFigureOut">
               <a:rPr lang="en-US" smtClean="0"/>
-              <a:t>3/25/15</a:t>
+              <a:t>3/26/15</a:t>
             </a:fld>
             <a:endParaRPr lang="en-US"/>
           </a:p>
@@ -3513,7 +3621,7 @@
           <a:p>
             <a:fld id="{DA4A72E3-DFDF-4B5F-92BB-09FFBD549BB9}" type="datetimeFigureOut">
               <a:rPr lang="en-US" smtClean="0"/>
-              <a:t>3/25/15</a:t>
+              <a:t>3/26/15</a:t>
             </a:fld>
             <a:endParaRPr lang="en-US"/>
           </a:p>
@@ -3683,7 +3791,7 @@
           <a:p>
             <a:fld id="{DA4A72E3-DFDF-4B5F-92BB-09FFBD549BB9}" type="datetimeFigureOut">
               <a:rPr lang="en-US" smtClean="0"/>
-              <a:t>3/25/15</a:t>
+              <a:t>3/26/15</a:t>
             </a:fld>
             <a:endParaRPr lang="en-US"/>
           </a:p>
@@ -3954,7 +4062,7 @@
           <a:p>
             <a:fld id="{DA4A72E3-DFDF-4B5F-92BB-09FFBD549BB9}" type="datetimeFigureOut">
               <a:rPr lang="en-US" smtClean="0"/>
-              <a:t>3/25/15</a:t>
+              <a:t>3/26/15</a:t>
             </a:fld>
             <a:endParaRPr lang="en-US"/>
           </a:p>
@@ -4124,7 +4232,7 @@
           <a:p>
             <a:fld id="{DA4A72E3-DFDF-4B5F-92BB-09FFBD549BB9}" type="datetimeFigureOut">
               <a:rPr lang="en-US" smtClean="0"/>
-              <a:t>3/25/15</a:t>
+              <a:t>3/26/15</a:t>
             </a:fld>
             <a:endParaRPr lang="en-US"/>
           </a:p>
@@ -4304,7 +4412,7 @@
           <a:p>
             <a:fld id="{DA4A72E3-DFDF-4B5F-92BB-09FFBD549BB9}" type="datetimeFigureOut">
               <a:rPr lang="en-US" smtClean="0"/>
-              <a:t>3/25/15</a:t>
+              <a:t>3/26/15</a:t>
             </a:fld>
             <a:endParaRPr lang="en-US"/>
           </a:p>
@@ -4507,7 +4615,7 @@
           <a:p>
             <a:fld id="{DA4A72E3-DFDF-4B5F-92BB-09FFBD549BB9}" type="datetimeFigureOut">
               <a:rPr lang="en-US" smtClean="0"/>
-              <a:t>3/25/15</a:t>
+              <a:t>3/26/15</a:t>
             </a:fld>
             <a:endParaRPr lang="en-US"/>
           </a:p>
@@ -4677,7 +4785,7 @@
           <a:p>
             <a:fld id="{DA4A72E3-DFDF-4B5F-92BB-09FFBD549BB9}" type="datetimeFigureOut">
               <a:rPr lang="en-US" smtClean="0"/>
-              <a:t>3/25/15</a:t>
+              <a:t>3/26/15</a:t>
             </a:fld>
             <a:endParaRPr lang="en-US"/>
           </a:p>
@@ -4928,7 +5036,7 @@
           <a:p>
             <a:fld id="{DA4A72E3-DFDF-4B5F-92BB-09FFBD549BB9}" type="datetimeFigureOut">
               <a:rPr lang="en-US" smtClean="0"/>
-              <a:t>3/25/15</a:t>
+              <a:t>3/26/15</a:t>
             </a:fld>
             <a:endParaRPr lang="en-US"/>
           </a:p>
@@ -5160,7 +5268,7 @@
           <a:p>
             <a:fld id="{DA4A72E3-DFDF-4B5F-92BB-09FFBD549BB9}" type="datetimeFigureOut">
               <a:rPr lang="en-US" smtClean="0"/>
-              <a:t>3/25/15</a:t>
+              <a:t>3/26/15</a:t>
             </a:fld>
             <a:endParaRPr lang="en-US"/>
           </a:p>
@@ -5507,7 +5615,7 @@
           <a:p>
             <a:fld id="{DA4A72E3-DFDF-4B5F-92BB-09FFBD549BB9}" type="datetimeFigureOut">
               <a:rPr lang="en-US" smtClean="0"/>
-              <a:t>3/25/15</a:t>
+              <a:t>3/26/15</a:t>
             </a:fld>
             <a:endParaRPr lang="en-US"/>
           </a:p>
@@ -5625,7 +5733,7 @@
           <a:p>
             <a:fld id="{DA4A72E3-DFDF-4B5F-92BB-09FFBD549BB9}" type="datetimeFigureOut">
               <a:rPr lang="en-US" smtClean="0"/>
-              <a:t>3/25/15</a:t>
+              <a:t>3/26/15</a:t>
             </a:fld>
             <a:endParaRPr lang="en-US"/>
           </a:p>
@@ -5743,7 +5851,7 @@
           <a:p>
             <a:fld id="{DA4A72E3-DFDF-4B5F-92BB-09FFBD549BB9}" type="datetimeFigureOut">
               <a:rPr lang="en-US" smtClean="0"/>
-              <a:t>3/25/15</a:t>
+              <a:t>3/26/15</a:t>
             </a:fld>
             <a:endParaRPr lang="en-US"/>
           </a:p>
@@ -5994,7 +6102,7 @@
           <a:p>
             <a:fld id="{DA4A72E3-DFDF-4B5F-92BB-09FFBD549BB9}" type="datetimeFigureOut">
               <a:rPr lang="en-US" smtClean="0"/>
-              <a:t>3/25/15</a:t>
+              <a:t>3/26/15</a:t>
             </a:fld>
             <a:endParaRPr lang="en-US"/>
           </a:p>
@@ -6278,7 +6386,7 @@
           <a:p>
             <a:fld id="{DA4A72E3-DFDF-4B5F-92BB-09FFBD549BB9}" type="datetimeFigureOut">
               <a:rPr lang="en-US" smtClean="0"/>
-              <a:t>3/25/15</a:t>
+              <a:t>3/26/15</a:t>
             </a:fld>
             <a:endParaRPr lang="en-US"/>
           </a:p>
@@ -6542,7 +6650,7 @@
           <a:p>
             <a:fld id="{DA4A72E3-DFDF-4B5F-92BB-09FFBD549BB9}" type="datetimeFigureOut">
               <a:rPr lang="en-US" smtClean="0"/>
-              <a:t>3/25/15</a:t>
+              <a:t>3/26/15</a:t>
             </a:fld>
             <a:endParaRPr lang="en-US"/>
           </a:p>
@@ -6712,7 +6820,7 @@
           <a:p>
             <a:fld id="{DA4A72E3-DFDF-4B5F-92BB-09FFBD549BB9}" type="datetimeFigureOut">
               <a:rPr lang="en-US" smtClean="0"/>
-              <a:t>3/25/15</a:t>
+              <a:t>3/26/15</a:t>
             </a:fld>
             <a:endParaRPr lang="en-US"/>
           </a:p>
@@ -6892,7 +7000,7 @@
           <a:p>
             <a:fld id="{DA4A72E3-DFDF-4B5F-92BB-09FFBD549BB9}" type="datetimeFigureOut">
               <a:rPr lang="en-US" smtClean="0"/>
-              <a:t>3/25/15</a:t>
+              <a:t>3/26/15</a:t>
             </a:fld>
             <a:endParaRPr lang="en-US"/>
           </a:p>
@@ -7095,7 +7203,7 @@
           <a:p>
             <a:fld id="{DA4A72E3-DFDF-4B5F-92BB-09FFBD549BB9}" type="datetimeFigureOut">
               <a:rPr lang="en-US" smtClean="0"/>
-              <a:t>3/25/15</a:t>
+              <a:t>3/26/15</a:t>
             </a:fld>
             <a:endParaRPr lang="en-US"/>
           </a:p>
@@ -7265,7 +7373,7 @@
           <a:p>
             <a:fld id="{DA4A72E3-DFDF-4B5F-92BB-09FFBD549BB9}" type="datetimeFigureOut">
               <a:rPr lang="en-US" smtClean="0"/>
-              <a:t>3/25/15</a:t>
+              <a:t>3/26/15</a:t>
             </a:fld>
             <a:endParaRPr lang="en-US"/>
           </a:p>
@@ -7516,7 +7624,7 @@
           <a:p>
             <a:fld id="{DA4A72E3-DFDF-4B5F-92BB-09FFBD549BB9}" type="datetimeFigureOut">
               <a:rPr lang="en-US" smtClean="0"/>
-              <a:t>3/25/15</a:t>
+              <a:t>3/26/15</a:t>
             </a:fld>
             <a:endParaRPr lang="en-US"/>
           </a:p>
@@ -7748,7 +7856,7 @@
           <a:p>
             <a:fld id="{DA4A72E3-DFDF-4B5F-92BB-09FFBD549BB9}" type="datetimeFigureOut">
               <a:rPr lang="en-US" smtClean="0"/>
-              <a:t>3/25/15</a:t>
+              <a:t>3/26/15</a:t>
             </a:fld>
             <a:endParaRPr lang="en-US"/>
           </a:p>
@@ -8095,7 +8203,7 @@
           <a:p>
             <a:fld id="{DA4A72E3-DFDF-4B5F-92BB-09FFBD549BB9}" type="datetimeFigureOut">
               <a:rPr lang="en-US" smtClean="0"/>
-              <a:t>3/25/15</a:t>
+              <a:t>3/26/15</a:t>
             </a:fld>
             <a:endParaRPr lang="en-US"/>
           </a:p>
@@ -8213,7 +8321,7 @@
           <a:p>
             <a:fld id="{DA4A72E3-DFDF-4B5F-92BB-09FFBD549BB9}" type="datetimeFigureOut">
               <a:rPr lang="en-US" smtClean="0"/>
-              <a:t>3/25/15</a:t>
+              <a:t>3/26/15</a:t>
             </a:fld>
             <a:endParaRPr lang="en-US"/>
           </a:p>
@@ -8468,7 +8576,7 @@
           <a:p>
             <a:fld id="{DA4A72E3-DFDF-4B5F-92BB-09FFBD549BB9}" type="datetimeFigureOut">
               <a:rPr lang="en-US" smtClean="0"/>
-              <a:t>3/25/15</a:t>
+              <a:t>3/26/15</a:t>
             </a:fld>
             <a:endParaRPr lang="en-US"/>
           </a:p>
@@ -8563,7 +8671,7 @@
           <a:p>
             <a:fld id="{DA4A72E3-DFDF-4B5F-92BB-09FFBD549BB9}" type="datetimeFigureOut">
               <a:rPr lang="en-US" smtClean="0"/>
-              <a:t>3/25/15</a:t>
+              <a:t>3/26/15</a:t>
             </a:fld>
             <a:endParaRPr lang="en-US"/>
           </a:p>
@@ -8847,7 +8955,7 @@
           <a:p>
             <a:fld id="{DA4A72E3-DFDF-4B5F-92BB-09FFBD549BB9}" type="datetimeFigureOut">
               <a:rPr lang="en-US" smtClean="0"/>
-              <a:t>3/25/15</a:t>
+              <a:t>3/26/15</a:t>
             </a:fld>
             <a:endParaRPr lang="en-US"/>
           </a:p>
@@ -9111,7 +9219,7 @@
           <a:p>
             <a:fld id="{DA4A72E3-DFDF-4B5F-92BB-09FFBD549BB9}" type="datetimeFigureOut">
               <a:rPr lang="en-US" smtClean="0"/>
-              <a:t>3/25/15</a:t>
+              <a:t>3/26/15</a:t>
             </a:fld>
             <a:endParaRPr lang="en-US"/>
           </a:p>
@@ -9281,7 +9389,7 @@
           <a:p>
             <a:fld id="{DA4A72E3-DFDF-4B5F-92BB-09FFBD549BB9}" type="datetimeFigureOut">
               <a:rPr lang="en-US" smtClean="0"/>
-              <a:t>3/25/15</a:t>
+              <a:t>3/26/15</a:t>
             </a:fld>
             <a:endParaRPr lang="en-US"/>
           </a:p>
@@ -9461,7 +9569,7 @@
           <a:p>
             <a:fld id="{DA4A72E3-DFDF-4B5F-92BB-09FFBD549BB9}" type="datetimeFigureOut">
               <a:rPr lang="en-US" smtClean="0"/>
-              <a:t>3/25/15</a:t>
+              <a:t>3/26/15</a:t>
             </a:fld>
             <a:endParaRPr lang="en-US"/>
           </a:p>
@@ -9664,7 +9772,7 @@
           <a:p>
             <a:fld id="{DA4A72E3-DFDF-4B5F-92BB-09FFBD549BB9}" type="datetimeFigureOut">
               <a:rPr lang="en-US" smtClean="0"/>
-              <a:t>3/25/15</a:t>
+              <a:t>3/26/15</a:t>
             </a:fld>
             <a:endParaRPr lang="en-US"/>
           </a:p>
@@ -9834,7 +9942,7 @@
           <a:p>
             <a:fld id="{DA4A72E3-DFDF-4B5F-92BB-09FFBD549BB9}" type="datetimeFigureOut">
               <a:rPr lang="en-US" smtClean="0"/>
-              <a:t>3/25/15</a:t>
+              <a:t>3/26/15</a:t>
             </a:fld>
             <a:endParaRPr lang="en-US"/>
           </a:p>
@@ -10085,7 +10193,7 @@
           <a:p>
             <a:fld id="{DA4A72E3-DFDF-4B5F-92BB-09FFBD549BB9}" type="datetimeFigureOut">
               <a:rPr lang="en-US" smtClean="0"/>
-              <a:t>3/25/15</a:t>
+              <a:t>3/26/15</a:t>
             </a:fld>
             <a:endParaRPr lang="en-US"/>
           </a:p>
@@ -10317,7 +10425,7 @@
           <a:p>
             <a:fld id="{DA4A72E3-DFDF-4B5F-92BB-09FFBD549BB9}" type="datetimeFigureOut">
               <a:rPr lang="en-US" smtClean="0"/>
-              <a:t>3/25/15</a:t>
+              <a:t>3/26/15</a:t>
             </a:fld>
             <a:endParaRPr lang="en-US"/>
           </a:p>
@@ -10664,7 +10772,7 @@
           <a:p>
             <a:fld id="{DA4A72E3-DFDF-4B5F-92BB-09FFBD549BB9}" type="datetimeFigureOut">
               <a:rPr lang="en-US" smtClean="0"/>
-              <a:t>3/25/15</a:t>
+              <a:t>3/26/15</a:t>
             </a:fld>
             <a:endParaRPr lang="en-US"/>
           </a:p>
@@ -11034,7 +11142,7 @@
           <a:p>
             <a:fld id="{DA4A72E3-DFDF-4B5F-92BB-09FFBD549BB9}" type="datetimeFigureOut">
               <a:rPr lang="en-US" smtClean="0"/>
-              <a:t>3/25/15</a:t>
+              <a:t>3/26/15</a:t>
             </a:fld>
             <a:endParaRPr lang="en-US"/>
           </a:p>
@@ -11152,7 +11260,7 @@
           <a:p>
             <a:fld id="{DA4A72E3-DFDF-4B5F-92BB-09FFBD549BB9}" type="datetimeFigureOut">
               <a:rPr lang="en-US" smtClean="0"/>
-              <a:t>3/25/15</a:t>
+              <a:t>3/26/15</a:t>
             </a:fld>
             <a:endParaRPr lang="en-US"/>
           </a:p>
@@ -11270,7 +11378,7 @@
           <a:p>
             <a:fld id="{DA4A72E3-DFDF-4B5F-92BB-09FFBD549BB9}" type="datetimeFigureOut">
               <a:rPr lang="en-US" smtClean="0"/>
-              <a:t>3/25/15</a:t>
+              <a:t>3/26/15</a:t>
             </a:fld>
             <a:endParaRPr lang="en-US"/>
           </a:p>
@@ -11554,7 +11662,7 @@
           <a:p>
             <a:fld id="{DA4A72E3-DFDF-4B5F-92BB-09FFBD549BB9}" type="datetimeFigureOut">
               <a:rPr lang="en-US" smtClean="0"/>
-              <a:t>3/25/15</a:t>
+              <a:t>3/26/15</a:t>
             </a:fld>
             <a:endParaRPr lang="en-US"/>
           </a:p>
@@ -11818,7 +11926,7 @@
           <a:p>
             <a:fld id="{DA4A72E3-DFDF-4B5F-92BB-09FFBD549BB9}" type="datetimeFigureOut">
               <a:rPr lang="en-US" smtClean="0"/>
-              <a:t>3/25/15</a:t>
+              <a:t>3/26/15</a:t>
             </a:fld>
             <a:endParaRPr lang="en-US"/>
           </a:p>
@@ -11988,7 +12096,7 @@
           <a:p>
             <a:fld id="{DA4A72E3-DFDF-4B5F-92BB-09FFBD549BB9}" type="datetimeFigureOut">
               <a:rPr lang="en-US" smtClean="0"/>
-              <a:t>3/25/15</a:t>
+              <a:t>3/26/15</a:t>
             </a:fld>
             <a:endParaRPr lang="en-US"/>
           </a:p>
@@ -12168,7 +12276,7 @@
           <a:p>
             <a:fld id="{DA4A72E3-DFDF-4B5F-92BB-09FFBD549BB9}" type="datetimeFigureOut">
               <a:rPr lang="en-US" smtClean="0"/>
-              <a:t>3/25/15</a:t>
+              <a:t>3/26/15</a:t>
             </a:fld>
             <a:endParaRPr lang="en-US"/>
           </a:p>
@@ -12263,7 +12371,7 @@
           <a:p>
             <a:fld id="{DA4A72E3-DFDF-4B5F-92BB-09FFBD549BB9}" type="datetimeFigureOut">
               <a:rPr lang="en-US" smtClean="0"/>
-              <a:t>3/25/15</a:t>
+              <a:t>3/26/15</a:t>
             </a:fld>
             <a:endParaRPr lang="en-US"/>
           </a:p>
@@ -12381,7 +12489,7 @@
           <a:p>
             <a:fld id="{DA4A72E3-DFDF-4B5F-92BB-09FFBD549BB9}" type="datetimeFigureOut">
               <a:rPr lang="en-US" smtClean="0"/>
-              <a:t>3/25/15</a:t>
+              <a:t>3/26/15</a:t>
             </a:fld>
             <a:endParaRPr lang="en-US"/>
           </a:p>
@@ -12665,7 +12773,7 @@
           <a:p>
             <a:fld id="{DA4A72E3-DFDF-4B5F-92BB-09FFBD549BB9}" type="datetimeFigureOut">
               <a:rPr lang="en-US" smtClean="0"/>
-              <a:t>3/25/15</a:t>
+              <a:t>3/26/15</a:t>
             </a:fld>
             <a:endParaRPr lang="en-US"/>
           </a:p>
@@ -12929,7 +13037,7 @@
           <a:p>
             <a:fld id="{DA4A72E3-DFDF-4B5F-92BB-09FFBD549BB9}" type="datetimeFigureOut">
               <a:rPr lang="en-US" smtClean="0"/>
-              <a:t>3/25/15</a:t>
+              <a:t>3/26/15</a:t>
             </a:fld>
             <a:endParaRPr lang="en-US"/>
           </a:p>
@@ -13148,7 +13256,7 @@
           <a:p>
             <a:fld id="{DA4A72E3-DFDF-4B5F-92BB-09FFBD549BB9}" type="datetimeFigureOut">
               <a:rPr lang="en-US" smtClean="0"/>
-              <a:t>3/25/15</a:t>
+              <a:t>3/26/15</a:t>
             </a:fld>
             <a:endParaRPr lang="en-US"/>
           </a:p>
@@ -13685,7 +13793,7 @@
           <a:p>
             <a:fld id="{DA4A72E3-DFDF-4B5F-92BB-09FFBD549BB9}" type="datetimeFigureOut">
               <a:rPr lang="en-US" smtClean="0"/>
-              <a:t>3/25/15</a:t>
+              <a:t>3/26/15</a:t>
             </a:fld>
             <a:endParaRPr lang="en-US"/>
           </a:p>
@@ -14215,7 +14323,7 @@
           <a:p>
             <a:fld id="{DA4A72E3-DFDF-4B5F-92BB-09FFBD549BB9}" type="datetimeFigureOut">
               <a:rPr lang="en-US" smtClean="0"/>
-              <a:t>3/25/15</a:t>
+              <a:t>3/26/15</a:t>
             </a:fld>
             <a:endParaRPr lang="en-US"/>
           </a:p>
@@ -14745,7 +14853,7 @@
           <a:p>
             <a:fld id="{DA4A72E3-DFDF-4B5F-92BB-09FFBD549BB9}" type="datetimeFigureOut">
               <a:rPr lang="en-US" smtClean="0"/>
-              <a:t>3/25/15</a:t>
+              <a:t>3/26/15</a:t>
             </a:fld>
             <a:endParaRPr lang="en-US"/>
           </a:p>
@@ -15275,7 +15383,7 @@
           <a:p>
             <a:fld id="{DA4A72E3-DFDF-4B5F-92BB-09FFBD549BB9}" type="datetimeFigureOut">
               <a:rPr lang="en-US" smtClean="0"/>
-              <a:t>3/25/15</a:t>
+              <a:t>3/26/15</a:t>
             </a:fld>
             <a:endParaRPr lang="en-US"/>
           </a:p>
@@ -19232,7 +19340,7 @@
   <a:extraClrSchemeLst/>
   <a:extLst>
     <a:ext uri="{05A4C25C-085E-4340-85A3-A5531E510DB2}">
-      <thm15:themeFamily xmlns="" xmlns:thm15="http://schemas.microsoft.com/office/thememl/2012/main" name="Office Theme" id="{62F939B6-93AF-4DB8-9C6B-D6C7DFDC589F}" vid="{4A3C46E8-61CC-4603-A589-7422A47A8E4A}"/>
+      <thm15:themeFamily xmlns:thm15="http://schemas.microsoft.com/office/thememl/2012/main" xmlns="" name="Office Theme" id="{62F939B6-93AF-4DB8-9C6B-D6C7DFDC589F}" vid="{4A3C46E8-61CC-4603-A589-7422A47A8E4A}"/>
     </a:ext>
   </a:extLst>
 </a:theme>

</xml_diff>

<commit_message>
JS Fix + slide updates
</commit_message>
<xml_diff>
--- a/Slides/MVC UI Slides.pptx
+++ b/Slides/MVC UI Slides.pptx
@@ -210,7 +210,7 @@
           <a:p>
             <a:fld id="{65C92C92-0600-44E4-B8C5-BE31105EB93E}" type="datetimeFigureOut">
               <a:rPr lang="en-US" smtClean="0"/>
-              <a:t>3/26/15</a:t>
+              <a:t>3/27/15</a:t>
             </a:fld>
             <a:endParaRPr lang="en-US"/>
           </a:p>
@@ -1541,7 +1541,7 @@
           <a:p>
             <a:fld id="{DA4A72E3-DFDF-4B5F-92BB-09FFBD549BB9}" type="datetimeFigureOut">
               <a:rPr lang="en-US" smtClean="0"/>
-              <a:t>3/26/15</a:t>
+              <a:t>3/27/15</a:t>
             </a:fld>
             <a:endParaRPr lang="en-US"/>
           </a:p>
@@ -1718,7 +1718,7 @@
           <a:p>
             <a:fld id="{DA4A72E3-DFDF-4B5F-92BB-09FFBD549BB9}" type="datetimeFigureOut">
               <a:rPr lang="en-US" smtClean="0"/>
-              <a:t>3/26/15</a:t>
+              <a:t>3/27/15</a:t>
             </a:fld>
             <a:endParaRPr lang="en-US"/>
           </a:p>
@@ -1898,7 +1898,7 @@
           <a:p>
             <a:fld id="{DA4A72E3-DFDF-4B5F-92BB-09FFBD549BB9}" type="datetimeFigureOut">
               <a:rPr lang="en-US" smtClean="0"/>
-              <a:t>3/26/15</a:t>
+              <a:t>3/27/15</a:t>
             </a:fld>
             <a:endParaRPr lang="en-US"/>
           </a:p>
@@ -2101,7 +2101,7 @@
           <a:p>
             <a:fld id="{DA4A72E3-DFDF-4B5F-92BB-09FFBD549BB9}" type="datetimeFigureOut">
               <a:rPr lang="en-US" smtClean="0"/>
-              <a:t>3/26/15</a:t>
+              <a:t>3/27/15</a:t>
             </a:fld>
             <a:endParaRPr lang="en-US"/>
           </a:p>
@@ -2271,7 +2271,7 @@
           <a:p>
             <a:fld id="{DA4A72E3-DFDF-4B5F-92BB-09FFBD549BB9}" type="datetimeFigureOut">
               <a:rPr lang="en-US" smtClean="0"/>
-              <a:t>3/26/15</a:t>
+              <a:t>3/27/15</a:t>
             </a:fld>
             <a:endParaRPr lang="en-US"/>
           </a:p>
@@ -2522,7 +2522,7 @@
           <a:p>
             <a:fld id="{DA4A72E3-DFDF-4B5F-92BB-09FFBD549BB9}" type="datetimeFigureOut">
               <a:rPr lang="en-US" smtClean="0"/>
-              <a:t>3/26/15</a:t>
+              <a:t>3/27/15</a:t>
             </a:fld>
             <a:endParaRPr lang="en-US"/>
           </a:p>
@@ -2754,7 +2754,7 @@
           <a:p>
             <a:fld id="{DA4A72E3-DFDF-4B5F-92BB-09FFBD549BB9}" type="datetimeFigureOut">
               <a:rPr lang="en-US" smtClean="0"/>
-              <a:t>3/26/15</a:t>
+              <a:t>3/27/15</a:t>
             </a:fld>
             <a:endParaRPr lang="en-US"/>
           </a:p>
@@ -3101,7 +3101,7 @@
           <a:p>
             <a:fld id="{DA4A72E3-DFDF-4B5F-92BB-09FFBD549BB9}" type="datetimeFigureOut">
               <a:rPr lang="en-US" smtClean="0"/>
-              <a:t>3/26/15</a:t>
+              <a:t>3/27/15</a:t>
             </a:fld>
             <a:endParaRPr lang="en-US"/>
           </a:p>
@@ -3219,7 +3219,7 @@
           <a:p>
             <a:fld id="{DA4A72E3-DFDF-4B5F-92BB-09FFBD549BB9}" type="datetimeFigureOut">
               <a:rPr lang="en-US" smtClean="0"/>
-              <a:t>3/26/15</a:t>
+              <a:t>3/27/15</a:t>
             </a:fld>
             <a:endParaRPr lang="en-US"/>
           </a:p>
@@ -3337,7 +3337,7 @@
           <a:p>
             <a:fld id="{DA4A72E3-DFDF-4B5F-92BB-09FFBD549BB9}" type="datetimeFigureOut">
               <a:rPr lang="en-US" smtClean="0"/>
-              <a:t>3/26/15</a:t>
+              <a:t>3/27/15</a:t>
             </a:fld>
             <a:endParaRPr lang="en-US"/>
           </a:p>
@@ -3621,7 +3621,7 @@
           <a:p>
             <a:fld id="{DA4A72E3-DFDF-4B5F-92BB-09FFBD549BB9}" type="datetimeFigureOut">
               <a:rPr lang="en-US" smtClean="0"/>
-              <a:t>3/26/15</a:t>
+              <a:t>3/27/15</a:t>
             </a:fld>
             <a:endParaRPr lang="en-US"/>
           </a:p>
@@ -3791,7 +3791,7 @@
           <a:p>
             <a:fld id="{DA4A72E3-DFDF-4B5F-92BB-09FFBD549BB9}" type="datetimeFigureOut">
               <a:rPr lang="en-US" smtClean="0"/>
-              <a:t>3/26/15</a:t>
+              <a:t>3/27/15</a:t>
             </a:fld>
             <a:endParaRPr lang="en-US"/>
           </a:p>
@@ -4062,7 +4062,7 @@
           <a:p>
             <a:fld id="{DA4A72E3-DFDF-4B5F-92BB-09FFBD549BB9}" type="datetimeFigureOut">
               <a:rPr lang="en-US" smtClean="0"/>
-              <a:t>3/26/15</a:t>
+              <a:t>3/27/15</a:t>
             </a:fld>
             <a:endParaRPr lang="en-US"/>
           </a:p>
@@ -4232,7 +4232,7 @@
           <a:p>
             <a:fld id="{DA4A72E3-DFDF-4B5F-92BB-09FFBD549BB9}" type="datetimeFigureOut">
               <a:rPr lang="en-US" smtClean="0"/>
-              <a:t>3/26/15</a:t>
+              <a:t>3/27/15</a:t>
             </a:fld>
             <a:endParaRPr lang="en-US"/>
           </a:p>
@@ -4412,7 +4412,7 @@
           <a:p>
             <a:fld id="{DA4A72E3-DFDF-4B5F-92BB-09FFBD549BB9}" type="datetimeFigureOut">
               <a:rPr lang="en-US" smtClean="0"/>
-              <a:t>3/26/15</a:t>
+              <a:t>3/27/15</a:t>
             </a:fld>
             <a:endParaRPr lang="en-US"/>
           </a:p>
@@ -4615,7 +4615,7 @@
           <a:p>
             <a:fld id="{DA4A72E3-DFDF-4B5F-92BB-09FFBD549BB9}" type="datetimeFigureOut">
               <a:rPr lang="en-US" smtClean="0"/>
-              <a:t>3/26/15</a:t>
+              <a:t>3/27/15</a:t>
             </a:fld>
             <a:endParaRPr lang="en-US"/>
           </a:p>
@@ -4785,7 +4785,7 @@
           <a:p>
             <a:fld id="{DA4A72E3-DFDF-4B5F-92BB-09FFBD549BB9}" type="datetimeFigureOut">
               <a:rPr lang="en-US" smtClean="0"/>
-              <a:t>3/26/15</a:t>
+              <a:t>3/27/15</a:t>
             </a:fld>
             <a:endParaRPr lang="en-US"/>
           </a:p>
@@ -5036,7 +5036,7 @@
           <a:p>
             <a:fld id="{DA4A72E3-DFDF-4B5F-92BB-09FFBD549BB9}" type="datetimeFigureOut">
               <a:rPr lang="en-US" smtClean="0"/>
-              <a:t>3/26/15</a:t>
+              <a:t>3/27/15</a:t>
             </a:fld>
             <a:endParaRPr lang="en-US"/>
           </a:p>
@@ -5268,7 +5268,7 @@
           <a:p>
             <a:fld id="{DA4A72E3-DFDF-4B5F-92BB-09FFBD549BB9}" type="datetimeFigureOut">
               <a:rPr lang="en-US" smtClean="0"/>
-              <a:t>3/26/15</a:t>
+              <a:t>3/27/15</a:t>
             </a:fld>
             <a:endParaRPr lang="en-US"/>
           </a:p>
@@ -5615,7 +5615,7 @@
           <a:p>
             <a:fld id="{DA4A72E3-DFDF-4B5F-92BB-09FFBD549BB9}" type="datetimeFigureOut">
               <a:rPr lang="en-US" smtClean="0"/>
-              <a:t>3/26/15</a:t>
+              <a:t>3/27/15</a:t>
             </a:fld>
             <a:endParaRPr lang="en-US"/>
           </a:p>
@@ -5733,7 +5733,7 @@
           <a:p>
             <a:fld id="{DA4A72E3-DFDF-4B5F-92BB-09FFBD549BB9}" type="datetimeFigureOut">
               <a:rPr lang="en-US" smtClean="0"/>
-              <a:t>3/26/15</a:t>
+              <a:t>3/27/15</a:t>
             </a:fld>
             <a:endParaRPr lang="en-US"/>
           </a:p>
@@ -5851,7 +5851,7 @@
           <a:p>
             <a:fld id="{DA4A72E3-DFDF-4B5F-92BB-09FFBD549BB9}" type="datetimeFigureOut">
               <a:rPr lang="en-US" smtClean="0"/>
-              <a:t>3/26/15</a:t>
+              <a:t>3/27/15</a:t>
             </a:fld>
             <a:endParaRPr lang="en-US"/>
           </a:p>
@@ -6102,7 +6102,7 @@
           <a:p>
             <a:fld id="{DA4A72E3-DFDF-4B5F-92BB-09FFBD549BB9}" type="datetimeFigureOut">
               <a:rPr lang="en-US" smtClean="0"/>
-              <a:t>3/26/15</a:t>
+              <a:t>3/27/15</a:t>
             </a:fld>
             <a:endParaRPr lang="en-US"/>
           </a:p>
@@ -6386,7 +6386,7 @@
           <a:p>
             <a:fld id="{DA4A72E3-DFDF-4B5F-92BB-09FFBD549BB9}" type="datetimeFigureOut">
               <a:rPr lang="en-US" smtClean="0"/>
-              <a:t>3/26/15</a:t>
+              <a:t>3/27/15</a:t>
             </a:fld>
             <a:endParaRPr lang="en-US"/>
           </a:p>
@@ -6650,7 +6650,7 @@
           <a:p>
             <a:fld id="{DA4A72E3-DFDF-4B5F-92BB-09FFBD549BB9}" type="datetimeFigureOut">
               <a:rPr lang="en-US" smtClean="0"/>
-              <a:t>3/26/15</a:t>
+              <a:t>3/27/15</a:t>
             </a:fld>
             <a:endParaRPr lang="en-US"/>
           </a:p>
@@ -6820,7 +6820,7 @@
           <a:p>
             <a:fld id="{DA4A72E3-DFDF-4B5F-92BB-09FFBD549BB9}" type="datetimeFigureOut">
               <a:rPr lang="en-US" smtClean="0"/>
-              <a:t>3/26/15</a:t>
+              <a:t>3/27/15</a:t>
             </a:fld>
             <a:endParaRPr lang="en-US"/>
           </a:p>
@@ -7000,7 +7000,7 @@
           <a:p>
             <a:fld id="{DA4A72E3-DFDF-4B5F-92BB-09FFBD549BB9}" type="datetimeFigureOut">
               <a:rPr lang="en-US" smtClean="0"/>
-              <a:t>3/26/15</a:t>
+              <a:t>3/27/15</a:t>
             </a:fld>
             <a:endParaRPr lang="en-US"/>
           </a:p>
@@ -7203,7 +7203,7 @@
           <a:p>
             <a:fld id="{DA4A72E3-DFDF-4B5F-92BB-09FFBD549BB9}" type="datetimeFigureOut">
               <a:rPr lang="en-US" smtClean="0"/>
-              <a:t>3/26/15</a:t>
+              <a:t>3/27/15</a:t>
             </a:fld>
             <a:endParaRPr lang="en-US"/>
           </a:p>
@@ -7373,7 +7373,7 @@
           <a:p>
             <a:fld id="{DA4A72E3-DFDF-4B5F-92BB-09FFBD549BB9}" type="datetimeFigureOut">
               <a:rPr lang="en-US" smtClean="0"/>
-              <a:t>3/26/15</a:t>
+              <a:t>3/27/15</a:t>
             </a:fld>
             <a:endParaRPr lang="en-US"/>
           </a:p>
@@ -7624,7 +7624,7 @@
           <a:p>
             <a:fld id="{DA4A72E3-DFDF-4B5F-92BB-09FFBD549BB9}" type="datetimeFigureOut">
               <a:rPr lang="en-US" smtClean="0"/>
-              <a:t>3/26/15</a:t>
+              <a:t>3/27/15</a:t>
             </a:fld>
             <a:endParaRPr lang="en-US"/>
           </a:p>
@@ -7856,7 +7856,7 @@
           <a:p>
             <a:fld id="{DA4A72E3-DFDF-4B5F-92BB-09FFBD549BB9}" type="datetimeFigureOut">
               <a:rPr lang="en-US" smtClean="0"/>
-              <a:t>3/26/15</a:t>
+              <a:t>3/27/15</a:t>
             </a:fld>
             <a:endParaRPr lang="en-US"/>
           </a:p>
@@ -8203,7 +8203,7 @@
           <a:p>
             <a:fld id="{DA4A72E3-DFDF-4B5F-92BB-09FFBD549BB9}" type="datetimeFigureOut">
               <a:rPr lang="en-US" smtClean="0"/>
-              <a:t>3/26/15</a:t>
+              <a:t>3/27/15</a:t>
             </a:fld>
             <a:endParaRPr lang="en-US"/>
           </a:p>
@@ -8321,7 +8321,7 @@
           <a:p>
             <a:fld id="{DA4A72E3-DFDF-4B5F-92BB-09FFBD549BB9}" type="datetimeFigureOut">
               <a:rPr lang="en-US" smtClean="0"/>
-              <a:t>3/26/15</a:t>
+              <a:t>3/27/15</a:t>
             </a:fld>
             <a:endParaRPr lang="en-US"/>
           </a:p>
@@ -8576,7 +8576,7 @@
           <a:p>
             <a:fld id="{DA4A72E3-DFDF-4B5F-92BB-09FFBD549BB9}" type="datetimeFigureOut">
               <a:rPr lang="en-US" smtClean="0"/>
-              <a:t>3/26/15</a:t>
+              <a:t>3/27/15</a:t>
             </a:fld>
             <a:endParaRPr lang="en-US"/>
           </a:p>
@@ -8671,7 +8671,7 @@
           <a:p>
             <a:fld id="{DA4A72E3-DFDF-4B5F-92BB-09FFBD549BB9}" type="datetimeFigureOut">
               <a:rPr lang="en-US" smtClean="0"/>
-              <a:t>3/26/15</a:t>
+              <a:t>3/27/15</a:t>
             </a:fld>
             <a:endParaRPr lang="en-US"/>
           </a:p>
@@ -8955,7 +8955,7 @@
           <a:p>
             <a:fld id="{DA4A72E3-DFDF-4B5F-92BB-09FFBD549BB9}" type="datetimeFigureOut">
               <a:rPr lang="en-US" smtClean="0"/>
-              <a:t>3/26/15</a:t>
+              <a:t>3/27/15</a:t>
             </a:fld>
             <a:endParaRPr lang="en-US"/>
           </a:p>
@@ -9219,7 +9219,7 @@
           <a:p>
             <a:fld id="{DA4A72E3-DFDF-4B5F-92BB-09FFBD549BB9}" type="datetimeFigureOut">
               <a:rPr lang="en-US" smtClean="0"/>
-              <a:t>3/26/15</a:t>
+              <a:t>3/27/15</a:t>
             </a:fld>
             <a:endParaRPr lang="en-US"/>
           </a:p>
@@ -9389,7 +9389,7 @@
           <a:p>
             <a:fld id="{DA4A72E3-DFDF-4B5F-92BB-09FFBD549BB9}" type="datetimeFigureOut">
               <a:rPr lang="en-US" smtClean="0"/>
-              <a:t>3/26/15</a:t>
+              <a:t>3/27/15</a:t>
             </a:fld>
             <a:endParaRPr lang="en-US"/>
           </a:p>
@@ -9569,7 +9569,7 @@
           <a:p>
             <a:fld id="{DA4A72E3-DFDF-4B5F-92BB-09FFBD549BB9}" type="datetimeFigureOut">
               <a:rPr lang="en-US" smtClean="0"/>
-              <a:t>3/26/15</a:t>
+              <a:t>3/27/15</a:t>
             </a:fld>
             <a:endParaRPr lang="en-US"/>
           </a:p>
@@ -9772,7 +9772,7 @@
           <a:p>
             <a:fld id="{DA4A72E3-DFDF-4B5F-92BB-09FFBD549BB9}" type="datetimeFigureOut">
               <a:rPr lang="en-US" smtClean="0"/>
-              <a:t>3/26/15</a:t>
+              <a:t>3/27/15</a:t>
             </a:fld>
             <a:endParaRPr lang="en-US"/>
           </a:p>
@@ -9942,7 +9942,7 @@
           <a:p>
             <a:fld id="{DA4A72E3-DFDF-4B5F-92BB-09FFBD549BB9}" type="datetimeFigureOut">
               <a:rPr lang="en-US" smtClean="0"/>
-              <a:t>3/26/15</a:t>
+              <a:t>3/27/15</a:t>
             </a:fld>
             <a:endParaRPr lang="en-US"/>
           </a:p>
@@ -10193,7 +10193,7 @@
           <a:p>
             <a:fld id="{DA4A72E3-DFDF-4B5F-92BB-09FFBD549BB9}" type="datetimeFigureOut">
               <a:rPr lang="en-US" smtClean="0"/>
-              <a:t>3/26/15</a:t>
+              <a:t>3/27/15</a:t>
             </a:fld>
             <a:endParaRPr lang="en-US"/>
           </a:p>
@@ -10425,7 +10425,7 @@
           <a:p>
             <a:fld id="{DA4A72E3-DFDF-4B5F-92BB-09FFBD549BB9}" type="datetimeFigureOut">
               <a:rPr lang="en-US" smtClean="0"/>
-              <a:t>3/26/15</a:t>
+              <a:t>3/27/15</a:t>
             </a:fld>
             <a:endParaRPr lang="en-US"/>
           </a:p>
@@ -10772,7 +10772,7 @@
           <a:p>
             <a:fld id="{DA4A72E3-DFDF-4B5F-92BB-09FFBD549BB9}" type="datetimeFigureOut">
               <a:rPr lang="en-US" smtClean="0"/>
-              <a:t>3/26/15</a:t>
+              <a:t>3/27/15</a:t>
             </a:fld>
             <a:endParaRPr lang="en-US"/>
           </a:p>
@@ -11142,7 +11142,7 @@
           <a:p>
             <a:fld id="{DA4A72E3-DFDF-4B5F-92BB-09FFBD549BB9}" type="datetimeFigureOut">
               <a:rPr lang="en-US" smtClean="0"/>
-              <a:t>3/26/15</a:t>
+              <a:t>3/27/15</a:t>
             </a:fld>
             <a:endParaRPr lang="en-US"/>
           </a:p>
@@ -11260,7 +11260,7 @@
           <a:p>
             <a:fld id="{DA4A72E3-DFDF-4B5F-92BB-09FFBD549BB9}" type="datetimeFigureOut">
               <a:rPr lang="en-US" smtClean="0"/>
-              <a:t>3/26/15</a:t>
+              <a:t>3/27/15</a:t>
             </a:fld>
             <a:endParaRPr lang="en-US"/>
           </a:p>
@@ -11378,7 +11378,7 @@
           <a:p>
             <a:fld id="{DA4A72E3-DFDF-4B5F-92BB-09FFBD549BB9}" type="datetimeFigureOut">
               <a:rPr lang="en-US" smtClean="0"/>
-              <a:t>3/26/15</a:t>
+              <a:t>3/27/15</a:t>
             </a:fld>
             <a:endParaRPr lang="en-US"/>
           </a:p>
@@ -11662,7 +11662,7 @@
           <a:p>
             <a:fld id="{DA4A72E3-DFDF-4B5F-92BB-09FFBD549BB9}" type="datetimeFigureOut">
               <a:rPr lang="en-US" smtClean="0"/>
-              <a:t>3/26/15</a:t>
+              <a:t>3/27/15</a:t>
             </a:fld>
             <a:endParaRPr lang="en-US"/>
           </a:p>
@@ -11926,7 +11926,7 @@
           <a:p>
             <a:fld id="{DA4A72E3-DFDF-4B5F-92BB-09FFBD549BB9}" type="datetimeFigureOut">
               <a:rPr lang="en-US" smtClean="0"/>
-              <a:t>3/26/15</a:t>
+              <a:t>3/27/15</a:t>
             </a:fld>
             <a:endParaRPr lang="en-US"/>
           </a:p>
@@ -12096,7 +12096,7 @@
           <a:p>
             <a:fld id="{DA4A72E3-DFDF-4B5F-92BB-09FFBD549BB9}" type="datetimeFigureOut">
               <a:rPr lang="en-US" smtClean="0"/>
-              <a:t>3/26/15</a:t>
+              <a:t>3/27/15</a:t>
             </a:fld>
             <a:endParaRPr lang="en-US"/>
           </a:p>
@@ -12276,7 +12276,7 @@
           <a:p>
             <a:fld id="{DA4A72E3-DFDF-4B5F-92BB-09FFBD549BB9}" type="datetimeFigureOut">
               <a:rPr lang="en-US" smtClean="0"/>
-              <a:t>3/26/15</a:t>
+              <a:t>3/27/15</a:t>
             </a:fld>
             <a:endParaRPr lang="en-US"/>
           </a:p>
@@ -12371,7 +12371,7 @@
           <a:p>
             <a:fld id="{DA4A72E3-DFDF-4B5F-92BB-09FFBD549BB9}" type="datetimeFigureOut">
               <a:rPr lang="en-US" smtClean="0"/>
-              <a:t>3/26/15</a:t>
+              <a:t>3/27/15</a:t>
             </a:fld>
             <a:endParaRPr lang="en-US"/>
           </a:p>
@@ -12489,7 +12489,7 @@
           <a:p>
             <a:fld id="{DA4A72E3-DFDF-4B5F-92BB-09FFBD549BB9}" type="datetimeFigureOut">
               <a:rPr lang="en-US" smtClean="0"/>
-              <a:t>3/26/15</a:t>
+              <a:t>3/27/15</a:t>
             </a:fld>
             <a:endParaRPr lang="en-US"/>
           </a:p>
@@ -12773,7 +12773,7 @@
           <a:p>
             <a:fld id="{DA4A72E3-DFDF-4B5F-92BB-09FFBD549BB9}" type="datetimeFigureOut">
               <a:rPr lang="en-US" smtClean="0"/>
-              <a:t>3/26/15</a:t>
+              <a:t>3/27/15</a:t>
             </a:fld>
             <a:endParaRPr lang="en-US"/>
           </a:p>
@@ -13037,7 +13037,7 @@
           <a:p>
             <a:fld id="{DA4A72E3-DFDF-4B5F-92BB-09FFBD549BB9}" type="datetimeFigureOut">
               <a:rPr lang="en-US" smtClean="0"/>
-              <a:t>3/26/15</a:t>
+              <a:t>3/27/15</a:t>
             </a:fld>
             <a:endParaRPr lang="en-US"/>
           </a:p>
@@ -13256,7 +13256,7 @@
           <a:p>
             <a:fld id="{DA4A72E3-DFDF-4B5F-92BB-09FFBD549BB9}" type="datetimeFigureOut">
               <a:rPr lang="en-US" smtClean="0"/>
-              <a:t>3/26/15</a:t>
+              <a:t>3/27/15</a:t>
             </a:fld>
             <a:endParaRPr lang="en-US"/>
           </a:p>
@@ -13793,7 +13793,7 @@
           <a:p>
             <a:fld id="{DA4A72E3-DFDF-4B5F-92BB-09FFBD549BB9}" type="datetimeFigureOut">
               <a:rPr lang="en-US" smtClean="0"/>
-              <a:t>3/26/15</a:t>
+              <a:t>3/27/15</a:t>
             </a:fld>
             <a:endParaRPr lang="en-US"/>
           </a:p>
@@ -14323,7 +14323,7 @@
           <a:p>
             <a:fld id="{DA4A72E3-DFDF-4B5F-92BB-09FFBD549BB9}" type="datetimeFigureOut">
               <a:rPr lang="en-US" smtClean="0"/>
-              <a:t>3/26/15</a:t>
+              <a:t>3/27/15</a:t>
             </a:fld>
             <a:endParaRPr lang="en-US"/>
           </a:p>
@@ -14853,7 +14853,7 @@
           <a:p>
             <a:fld id="{DA4A72E3-DFDF-4B5F-92BB-09FFBD549BB9}" type="datetimeFigureOut">
               <a:rPr lang="en-US" smtClean="0"/>
-              <a:t>3/26/15</a:t>
+              <a:t>3/27/15</a:t>
             </a:fld>
             <a:endParaRPr lang="en-US"/>
           </a:p>
@@ -15383,7 +15383,7 @@
           <a:p>
             <a:fld id="{DA4A72E3-DFDF-4B5F-92BB-09FFBD549BB9}" type="datetimeFigureOut">
               <a:rPr lang="en-US" smtClean="0"/>
-              <a:t>3/26/15</a:t>
+              <a:t>3/27/15</a:t>
             </a:fld>
             <a:endParaRPr lang="en-US"/>
           </a:p>
@@ -16246,12 +16246,46 @@
           <a:lstStyle/>
           <a:p>
             <a:r>
+              <a:rPr lang="en-US" dirty="0" err="1"/>
+              <a:t>json</a:t>
+            </a:r>
+            <a:r>
+              <a:rPr lang="en-US" dirty="0"/>
+              <a:t> based configuration files</a:t>
+            </a:r>
+          </a:p>
+          <a:p>
+            <a:pPr lvl="1"/>
+            <a:r>
+              <a:rPr lang="en-US" dirty="0"/>
+              <a:t>No more XML </a:t>
+            </a:r>
+            <a:r>
+              <a:rPr lang="en-US" dirty="0" err="1"/>
+              <a:t>config</a:t>
+            </a:r>
+            <a:r>
+              <a:rPr lang="en-US" dirty="0"/>
+              <a:t> </a:t>
+            </a:r>
+            <a:r>
+              <a:rPr lang="en-US" dirty="0" smtClean="0"/>
+              <a:t>files</a:t>
+            </a:r>
+            <a:endParaRPr lang="en-US" dirty="0" smtClean="0"/>
+          </a:p>
+          <a:p>
+            <a:r>
               <a:rPr lang="en-US" dirty="0" err="1" smtClean="0"/>
               <a:t>Clientside</a:t>
             </a:r>
             <a:r>
               <a:rPr lang="en-US" dirty="0" smtClean="0"/>
-              <a:t> Package Management</a:t>
+              <a:t> </a:t>
+            </a:r>
+            <a:r>
+              <a:rPr lang="en-US" dirty="0" smtClean="0"/>
+              <a:t>Package Management</a:t>
             </a:r>
           </a:p>
           <a:p>
@@ -16291,35 +16325,6 @@
             <a:r>
               <a:rPr lang="en-US" dirty="0" smtClean="0"/>
               <a:t>Grunt or Gulp</a:t>
-            </a:r>
-          </a:p>
-          <a:p>
-            <a:r>
-              <a:rPr lang="en-US" dirty="0" err="1"/>
-              <a:t>j</a:t>
-            </a:r>
-            <a:r>
-              <a:rPr lang="en-US" dirty="0" err="1" smtClean="0"/>
-              <a:t>son</a:t>
-            </a:r>
-            <a:r>
-              <a:rPr lang="en-US" dirty="0" smtClean="0"/>
-              <a:t> based configuration files</a:t>
-            </a:r>
-          </a:p>
-          <a:p>
-            <a:pPr lvl="1"/>
-            <a:r>
-              <a:rPr lang="en-US" dirty="0" smtClean="0"/>
-              <a:t>No more XML </a:t>
-            </a:r>
-            <a:r>
-              <a:rPr lang="en-US" dirty="0" err="1" smtClean="0"/>
-              <a:t>config</a:t>
-            </a:r>
-            <a:r>
-              <a:rPr lang="en-US" dirty="0" smtClean="0"/>
-              <a:t> files</a:t>
             </a:r>
           </a:p>
           <a:p>
@@ -19340,7 +19345,7 @@
   <a:extraClrSchemeLst/>
   <a:extLst>
     <a:ext uri="{05A4C25C-085E-4340-85A3-A5531E510DB2}">
-      <thm15:themeFamily xmlns:thm15="http://schemas.microsoft.com/office/thememl/2012/main" xmlns="" name="Office Theme" id="{62F939B6-93AF-4DB8-9C6B-D6C7DFDC589F}" vid="{4A3C46E8-61CC-4603-A589-7422A47A8E4A}"/>
+      <thm15:themeFamily xmlns="" xmlns:thm15="http://schemas.microsoft.com/office/thememl/2012/main" name="Office Theme" id="{62F939B6-93AF-4DB8-9C6B-D6C7DFDC589F}" vid="{4A3C46E8-61CC-4603-A589-7422A47A8E4A}"/>
     </a:ext>
   </a:extLst>
 </a:theme>

</xml_diff>

<commit_message>
JS and slide updates
</commit_message>
<xml_diff>
--- a/Slides/MVC UI Slides.pptx
+++ b/Slides/MVC UI Slides.pptx
@@ -1097,52 +1097,121 @@
           <a:p>
             <a:r>
               <a:rPr lang="en-US" dirty="0" smtClean="0"/>
-              <a:t>http://commons.wikimedia.org/wiki/File:Bear_in_Hammock.JPG</a:t>
-            </a:r>
-          </a:p>
-          <a:p>
+              <a:t>Other architect-y</a:t>
+            </a:r>
+            <a:r>
+              <a:rPr lang="en-US" baseline="0" dirty="0" smtClean="0"/>
+              <a:t> things</a:t>
+            </a:r>
             <a:endParaRPr lang="en-US" dirty="0" smtClean="0"/>
           </a:p>
           <a:p>
+            <a:endParaRPr lang="en-US" dirty="0" smtClean="0"/>
+          </a:p>
+          <a:p>
             <a:r>
               <a:rPr lang="en-US" dirty="0" smtClean="0"/>
-              <a:t>Reference:</a:t>
-            </a:r>
-          </a:p>
-          <a:p>
-            <a:pPr marL="0" indent="0">
-              <a:buNone/>
+              <a:t>Because</a:t>
+            </a:r>
+            <a:r>
+              <a:rPr lang="en-US" baseline="0" dirty="0" smtClean="0"/>
+              <a:t> you don’t want to wear out ctrl – c and ctrl – v ...</a:t>
+            </a:r>
+          </a:p>
+          <a:p>
+            <a:endParaRPr lang="en-US" baseline="0" dirty="0" smtClean="0"/>
+          </a:p>
+          <a:p>
+            <a:pPr marL="0" marR="0" indent="0" algn="l" defTabSz="914400" rtl="0" eaLnBrk="1" fontAlgn="auto" latinLnBrk="0" hangingPunct="1">
+              <a:lnSpc>
+                <a:spcPct val="100000"/>
+              </a:lnSpc>
+              <a:spcBef>
+                <a:spcPts val="0"/>
+              </a:spcBef>
+              <a:spcAft>
+                <a:spcPts val="0"/>
+              </a:spcAft>
+              <a:buClrTx/>
+              <a:buSzTx/>
+              <a:buFontTx/>
+              <a:buNone/>
+              <a:tabLst/>
+              <a:defRPr/>
             </a:pPr>
             <a:r>
-              <a:rPr lang="en-US" sz="1200" dirty="0" smtClean="0"/>
-              <a:t>“We will encourage you to develop the three great virtues of a programmer: </a:t>
-            </a:r>
-          </a:p>
-          <a:p>
-            <a:pPr marL="0" indent="0">
-              <a:buNone/>
+              <a:rPr lang="en-US" dirty="0" smtClean="0"/>
+              <a:t>Changing the code in 100 places to implement a new date picker really sucks.</a:t>
+            </a:r>
+          </a:p>
+          <a:p>
+            <a:pPr marL="0" marR="0" indent="0" algn="l" defTabSz="914400" rtl="0" eaLnBrk="1" fontAlgn="auto" latinLnBrk="0" hangingPunct="1">
+              <a:lnSpc>
+                <a:spcPct val="100000"/>
+              </a:lnSpc>
+              <a:spcBef>
+                <a:spcPts val="0"/>
+              </a:spcBef>
+              <a:spcAft>
+                <a:spcPts val="0"/>
+              </a:spcAft>
+              <a:buClrTx/>
+              <a:buSzTx/>
+              <a:buFontTx/>
+              <a:buNone/>
+              <a:tabLst/>
+              <a:defRPr/>
             </a:pPr>
-            <a:r>
-              <a:rPr lang="en-US" sz="1200" i="1" dirty="0" smtClean="0"/>
-              <a:t>laziness, impatience, and hubris</a:t>
-            </a:r>
-            <a:r>
-              <a:rPr lang="en-US" sz="1200" dirty="0" smtClean="0"/>
-              <a:t>.”</a:t>
-            </a:r>
-          </a:p>
-          <a:p>
-            <a:pPr>
+            <a:endParaRPr lang="en-US" dirty="0" smtClean="0"/>
+          </a:p>
+          <a:p>
+            <a:pPr marL="0" marR="0" indent="0" algn="l" defTabSz="914400" rtl="0" eaLnBrk="1" fontAlgn="auto" latinLnBrk="0" hangingPunct="1">
+              <a:lnSpc>
+                <a:spcPct val="100000"/>
+              </a:lnSpc>
+              <a:spcBef>
+                <a:spcPts val="0"/>
+              </a:spcBef>
+              <a:spcAft>
+                <a:spcPts val="0"/>
+              </a:spcAft>
+              <a:buClrTx/>
+              <a:buSzTx/>
               <a:buFontTx/>
-              <a:buChar char="-"/>
+              <a:buNone/>
+              <a:tabLst/>
+              <a:defRPr/>
             </a:pPr>
             <a:r>
-              <a:rPr lang="en-US" sz="1100" dirty="0" smtClean="0"/>
-              <a:t>Larry Wall (He invented Perl)</a:t>
-            </a:r>
-          </a:p>
-          <a:p>
-            <a:endParaRPr lang="en-US" dirty="0" smtClean="0"/>
+              <a:rPr lang="en-US" dirty="0" smtClean="0"/>
+              <a:t>Anyone else have</a:t>
+            </a:r>
+            <a:r>
+              <a:rPr lang="en-US" baseline="0" dirty="0" smtClean="0"/>
+              <a:t> any lousy experiences with this? </a:t>
+            </a:r>
+            <a:r>
+              <a:rPr lang="en-US" dirty="0" smtClean="0"/>
+              <a:t> </a:t>
+            </a:r>
+          </a:p>
+          <a:p>
+            <a:endParaRPr lang="en-US" baseline="0" dirty="0" smtClean="0"/>
+          </a:p>
+          <a:p>
+            <a:endParaRPr lang="en-US" baseline="0" dirty="0" smtClean="0"/>
+          </a:p>
+          <a:p>
+            <a:endParaRPr lang="en-US" baseline="0" dirty="0" smtClean="0"/>
+          </a:p>
+          <a:p>
+            <a:endParaRPr lang="en-US" baseline="0" dirty="0" smtClean="0"/>
+          </a:p>
+          <a:p>
+            <a:endParaRPr lang="en-US" baseline="0" dirty="0" smtClean="0"/>
+          </a:p>
+          <a:p>
+            <a:endParaRPr lang="en-US" baseline="0" dirty="0" smtClean="0"/>
           </a:p>
           <a:p>
             <a:endParaRPr lang="en-US" dirty="0"/>
@@ -1166,7 +1235,7 @@
           <a:p>
             <a:fld id="{8379EAB3-DC98-4B09-BD7D-31DCCB97D8F1}" type="slidenum">
               <a:rPr lang="en-US" smtClean="0"/>
-              <a:t>8</a:t>
+              <a:t>7</a:t>
             </a:fld>
             <a:endParaRPr lang="en-US"/>
           </a:p>
@@ -1175,7 +1244,7 @@
     </p:spTree>
     <p:extLst>
       <p:ext uri="{BB962C8B-B14F-4D97-AF65-F5344CB8AC3E}">
-        <p14:creationId xmlns:p14="http://schemas.microsoft.com/office/powerpoint/2010/main" val="3700348553"/>
+        <p14:creationId xmlns:p14="http://schemas.microsoft.com/office/powerpoint/2010/main" val="554076127"/>
       </p:ext>
     </p:extLst>
   </p:cSld>
@@ -1231,29 +1300,55 @@
           <a:p>
             <a:r>
               <a:rPr lang="en-US" dirty="0" smtClean="0"/>
-              <a:t>Gauge the audience’s experience with ASP.NET</a:t>
-            </a:r>
-            <a:r>
-              <a:rPr lang="en-US" baseline="0" dirty="0" smtClean="0"/>
-              <a:t> MVC</a:t>
-            </a:r>
-          </a:p>
-          <a:p>
-            <a:endParaRPr lang="en-US" baseline="0" dirty="0" smtClean="0"/>
-          </a:p>
-          <a:p>
-            <a:r>
-              <a:rPr lang="en-US" baseline="0" smtClean="0"/>
-              <a:t>See </a:t>
-            </a:r>
-            <a:r>
-              <a:rPr lang="en-US" baseline="0" dirty="0" smtClean="0"/>
-              <a:t>what people are doing </a:t>
-            </a:r>
-            <a:r>
-              <a:rPr lang="en-US" baseline="0" smtClean="0"/>
-              <a:t>with it. </a:t>
-            </a:r>
+              <a:t>http://commons.wikimedia.org/wiki/File:Bear_in_Hammock.JPG</a:t>
+            </a:r>
+          </a:p>
+          <a:p>
+            <a:endParaRPr lang="en-US" dirty="0" smtClean="0"/>
+          </a:p>
+          <a:p>
+            <a:r>
+              <a:rPr lang="en-US" dirty="0" smtClean="0"/>
+              <a:t>Reference:</a:t>
+            </a:r>
+          </a:p>
+          <a:p>
+            <a:pPr marL="0" indent="0">
+              <a:buNone/>
+            </a:pPr>
+            <a:r>
+              <a:rPr lang="en-US" sz="1200" dirty="0" smtClean="0"/>
+              <a:t>“We will encourage you to develop the three great virtues of a programmer: </a:t>
+            </a:r>
+          </a:p>
+          <a:p>
+            <a:pPr marL="0" indent="0">
+              <a:buNone/>
+            </a:pPr>
+            <a:r>
+              <a:rPr lang="en-US" sz="1200" i="1" dirty="0" smtClean="0"/>
+              <a:t>laziness, impatience, and hubris</a:t>
+            </a:r>
+            <a:r>
+              <a:rPr lang="en-US" sz="1200" dirty="0" smtClean="0"/>
+              <a:t>.”</a:t>
+            </a:r>
+          </a:p>
+          <a:p>
+            <a:pPr>
+              <a:buFontTx/>
+              <a:buChar char="-"/>
+            </a:pPr>
+            <a:r>
+              <a:rPr lang="en-US" sz="1100" dirty="0" smtClean="0"/>
+              <a:t>Larry Wall (He invented Perl)</a:t>
+            </a:r>
+          </a:p>
+          <a:p>
+            <a:endParaRPr lang="en-US" dirty="0" smtClean="0"/>
+          </a:p>
+          <a:p>
+            <a:endParaRPr lang="en-US" dirty="0"/>
           </a:p>
         </p:txBody>
       </p:sp>
@@ -1274,7 +1369,7 @@
           <a:p>
             <a:fld id="{8379EAB3-DC98-4B09-BD7D-31DCCB97D8F1}" type="slidenum">
               <a:rPr lang="en-US" smtClean="0"/>
-              <a:t>9</a:t>
+              <a:t>8</a:t>
             </a:fld>
             <a:endParaRPr lang="en-US"/>
           </a:p>
@@ -1283,7 +1378,7 @@
     </p:spTree>
     <p:extLst>
       <p:ext uri="{BB962C8B-B14F-4D97-AF65-F5344CB8AC3E}">
-        <p14:creationId xmlns:p14="http://schemas.microsoft.com/office/powerpoint/2010/main" val="2258679237"/>
+        <p14:creationId xmlns:p14="http://schemas.microsoft.com/office/powerpoint/2010/main" val="3700348553"/>
       </p:ext>
     </p:extLst>
   </p:cSld>
@@ -1339,6 +1434,129 @@
           <a:p>
             <a:r>
               <a:rPr lang="en-US" dirty="0" smtClean="0"/>
+              <a:t>Gauge the audience’s experience with ASP.NET</a:t>
+            </a:r>
+            <a:r>
+              <a:rPr lang="en-US" baseline="0" dirty="0" smtClean="0"/>
+              <a:t> MVC</a:t>
+            </a:r>
+          </a:p>
+          <a:p>
+            <a:endParaRPr lang="en-US" baseline="0" dirty="0" smtClean="0"/>
+          </a:p>
+          <a:p>
+            <a:r>
+              <a:rPr lang="en-US" baseline="0" dirty="0" smtClean="0"/>
+              <a:t>See what people are doing with it. </a:t>
+            </a:r>
+            <a:endParaRPr lang="en-US" baseline="0" dirty="0" smtClean="0"/>
+          </a:p>
+          <a:p>
+            <a:endParaRPr lang="en-US" baseline="0" dirty="0" smtClean="0"/>
+          </a:p>
+          <a:p>
+            <a:r>
+              <a:rPr lang="en-US" baseline="0" dirty="0" smtClean="0"/>
+              <a:t>Who’s new to MVC? </a:t>
+            </a:r>
+          </a:p>
+          <a:p>
+            <a:r>
+              <a:rPr lang="en-US" baseline="0" dirty="0" smtClean="0"/>
+              <a:t>Who’s comfortable with MVC? </a:t>
+            </a:r>
+          </a:p>
+          <a:p>
+            <a:r>
+              <a:rPr lang="en-US" baseline="0" dirty="0" smtClean="0"/>
+              <a:t>I’ll be quizzing you.</a:t>
+            </a:r>
+            <a:endParaRPr lang="en-US" baseline="0" dirty="0" smtClean="0"/>
+          </a:p>
+        </p:txBody>
+      </p:sp>
+      <p:sp>
+        <p:nvSpPr>
+          <p:cNvPr id="4" name="Slide Number Placeholder 3"/>
+          <p:cNvSpPr>
+            <a:spLocks noGrp="1"/>
+          </p:cNvSpPr>
+          <p:nvPr>
+            <p:ph type="sldNum" sz="quarter" idx="10"/>
+          </p:nvPr>
+        </p:nvSpPr>
+        <p:spPr/>
+        <p:txBody>
+          <a:bodyPr/>
+          <a:lstStyle/>
+          <a:p>
+            <a:fld id="{8379EAB3-DC98-4B09-BD7D-31DCCB97D8F1}" type="slidenum">
+              <a:rPr lang="en-US" smtClean="0"/>
+              <a:t>9</a:t>
+            </a:fld>
+            <a:endParaRPr lang="en-US"/>
+          </a:p>
+        </p:txBody>
+      </p:sp>
+    </p:spTree>
+    <p:extLst>
+      <p:ext uri="{BB962C8B-B14F-4D97-AF65-F5344CB8AC3E}">
+        <p14:creationId xmlns:p14="http://schemas.microsoft.com/office/powerpoint/2010/main" val="2258679237"/>
+      </p:ext>
+    </p:extLst>
+  </p:cSld>
+  <p:clrMapOvr>
+    <a:masterClrMapping/>
+  </p:clrMapOvr>
+</p:notes>
+</file>
+
+<file path=ppt/notesSlides/notesSlide8.xml><?xml version="1.0" encoding="utf-8"?>
+<p:notes xmlns:a="http://schemas.openxmlformats.org/drawingml/2006/main" xmlns:r="http://schemas.openxmlformats.org/officeDocument/2006/relationships" xmlns:p="http://schemas.openxmlformats.org/presentationml/2006/main">
+  <p:cSld>
+    <p:spTree>
+      <p:nvGrpSpPr>
+        <p:cNvPr id="1" name=""/>
+        <p:cNvGrpSpPr/>
+        <p:nvPr/>
+      </p:nvGrpSpPr>
+      <p:grpSpPr>
+        <a:xfrm>
+          <a:off x="0" y="0"/>
+          <a:ext cx="0" cy="0"/>
+          <a:chOff x="0" y="0"/>
+          <a:chExt cx="0" cy="0"/>
+        </a:xfrm>
+      </p:grpSpPr>
+      <p:sp>
+        <p:nvSpPr>
+          <p:cNvPr id="2" name="Slide Image Placeholder 1"/>
+          <p:cNvSpPr>
+            <a:spLocks noGrp="1" noRot="1" noChangeAspect="1"/>
+          </p:cNvSpPr>
+          <p:nvPr>
+            <p:ph type="sldImg"/>
+          </p:nvPr>
+        </p:nvSpPr>
+        <p:spPr/>
+      </p:sp>
+      <p:sp>
+        <p:nvSpPr>
+          <p:cNvPr id="3" name="Notes Placeholder 2"/>
+          <p:cNvSpPr>
+            <a:spLocks noGrp="1"/>
+          </p:cNvSpPr>
+          <p:nvPr>
+            <p:ph type="body" idx="1"/>
+          </p:nvPr>
+        </p:nvSpPr>
+        <p:spPr/>
+        <p:txBody>
+          <a:bodyPr/>
+          <a:lstStyle/>
+          <a:p>
+            <a:r>
+              <a:rPr lang="en-US" dirty="0" smtClean="0"/>
               <a:t>ASP.NET MVC 6</a:t>
             </a:r>
             <a:r>
@@ -1357,6 +1575,19 @@
               <a:rPr lang="en-US" baseline="0" dirty="0" smtClean="0"/>
               <a:t>There are lots of changes, many of which are breaking changes. </a:t>
             </a:r>
+            <a:endParaRPr lang="en-US" baseline="0" dirty="0" smtClean="0"/>
+          </a:p>
+          <a:p>
+            <a:endParaRPr lang="en-US" baseline="0" dirty="0" smtClean="0"/>
+          </a:p>
+          <a:p>
+            <a:r>
+              <a:rPr lang="en-US" baseline="0" dirty="0" smtClean="0"/>
+              <a:t>I got burned making this demo… </a:t>
+            </a:r>
+          </a:p>
+          <a:p>
+            <a:endParaRPr lang="en-US" baseline="0" dirty="0" smtClean="0"/>
           </a:p>
           <a:p>
             <a:endParaRPr lang="en-US" dirty="0"/>
@@ -16024,8 +16255,25 @@
           <a:p>
             <a:r>
               <a:rPr lang="en-US" dirty="0" smtClean="0"/>
-              <a:t>Microsoft is bad at versioning (Entity Framework is at version 7)</a:t>
-            </a:r>
+              <a:t>Microsoft is bad at versioning </a:t>
+            </a:r>
+            <a:endParaRPr lang="en-US" dirty="0" smtClean="0"/>
+          </a:p>
+          <a:p>
+            <a:pPr lvl="1"/>
+            <a:r>
+              <a:rPr lang="en-US" dirty="0" smtClean="0"/>
+              <a:t>Entity </a:t>
+            </a:r>
+            <a:r>
+              <a:rPr lang="en-US" dirty="0" smtClean="0"/>
+              <a:t>Framework is at version </a:t>
+            </a:r>
+            <a:r>
+              <a:rPr lang="en-US" dirty="0" smtClean="0"/>
+              <a:t>7</a:t>
+            </a:r>
+            <a:endParaRPr lang="en-US" dirty="0" smtClean="0"/>
           </a:p>
           <a:p>
             <a:r>
@@ -16035,12 +16283,8 @@
           </a:p>
           <a:p>
             <a:r>
-              <a:rPr lang="en-US" smtClean="0"/>
-              <a:t>Conceptually similar</a:t>
-            </a:r>
-            <a:r>
               <a:rPr lang="en-US" dirty="0" smtClean="0"/>
-              <a:t>, but there’s lot of changes.</a:t>
+              <a:t>Conceptually similar, but there’s lot of changes.</a:t>
             </a:r>
           </a:p>
           <a:p>
@@ -16257,27 +16501,33 @@
           <a:p>
             <a:pPr lvl="1"/>
             <a:r>
-              <a:rPr lang="en-US" dirty="0"/>
-              <a:t>No more XML </a:t>
-            </a:r>
-            <a:r>
-              <a:rPr lang="en-US" dirty="0" err="1"/>
-              <a:t>config</a:t>
-            </a:r>
-            <a:r>
-              <a:rPr lang="en-US" dirty="0"/>
-              <a:t> </a:t>
-            </a:r>
-            <a:r>
               <a:rPr lang="en-US" dirty="0" smtClean="0"/>
-              <a:t>files</a:t>
+              <a:t>XML is so 2003…</a:t>
             </a:r>
             <a:endParaRPr lang="en-US" dirty="0" smtClean="0"/>
           </a:p>
           <a:p>
             <a:r>
+              <a:rPr lang="en-US" dirty="0" smtClean="0"/>
+              <a:t>Client side </a:t>
+            </a:r>
+            <a:r>
+              <a:rPr lang="en-US" dirty="0" smtClean="0"/>
+              <a:t>Package Management</a:t>
+            </a:r>
+          </a:p>
+          <a:p>
+            <a:pPr lvl="1"/>
+            <a:r>
+              <a:rPr lang="en-US" dirty="0" smtClean="0"/>
+              <a:t>Bower </a:t>
+            </a:r>
+          </a:p>
+          <a:p>
+            <a:pPr lvl="1"/>
+            <a:r>
               <a:rPr lang="en-US" dirty="0" err="1" smtClean="0"/>
-              <a:t>Clientside</a:t>
+              <a:t>NuGet</a:t>
             </a:r>
             <a:r>
               <a:rPr lang="en-US" dirty="0" smtClean="0"/>
@@ -16285,47 +16535,43 @@
             </a:r>
             <a:r>
               <a:rPr lang="en-US" dirty="0" smtClean="0"/>
-              <a:t>Package Management</a:t>
+              <a:t>for server packages</a:t>
+            </a:r>
+          </a:p>
+          <a:p>
+            <a:r>
+              <a:rPr lang="en-US" dirty="0" smtClean="0"/>
+              <a:t>Client side </a:t>
+            </a:r>
+            <a:r>
+              <a:rPr lang="en-US" dirty="0" smtClean="0"/>
+              <a:t>task runners</a:t>
             </a:r>
           </a:p>
           <a:p>
             <a:pPr lvl="1"/>
             <a:r>
               <a:rPr lang="en-US" dirty="0" smtClean="0"/>
-              <a:t>Bower </a:t>
+              <a:t>Grunt or </a:t>
+            </a:r>
+            <a:r>
+              <a:rPr lang="en-US" dirty="0" smtClean="0"/>
+              <a:t>Gulp</a:t>
+            </a:r>
+          </a:p>
+          <a:p>
+            <a:r>
+              <a:rPr lang="en-US" dirty="0" smtClean="0"/>
+              <a:t>Client side scaffolding</a:t>
             </a:r>
           </a:p>
           <a:p>
             <a:pPr lvl="1"/>
             <a:r>
               <a:rPr lang="en-US" dirty="0" smtClean="0"/>
-              <a:t>Still uses </a:t>
-            </a:r>
-            <a:r>
-              <a:rPr lang="en-US" dirty="0" err="1" smtClean="0"/>
-              <a:t>NuGet</a:t>
-            </a:r>
-            <a:r>
-              <a:rPr lang="en-US" dirty="0" smtClean="0"/>
-              <a:t> for server packages</a:t>
-            </a:r>
-          </a:p>
-          <a:p>
-            <a:r>
-              <a:rPr lang="en-US" dirty="0" err="1" smtClean="0"/>
-              <a:t>Clientside</a:t>
-            </a:r>
-            <a:r>
-              <a:rPr lang="en-US" dirty="0" smtClean="0"/>
-              <a:t> task runners</a:t>
-            </a:r>
-          </a:p>
-          <a:p>
-            <a:pPr lvl="1"/>
-            <a:r>
-              <a:rPr lang="en-US" dirty="0" smtClean="0"/>
-              <a:t>Grunt or Gulp</a:t>
-            </a:r>
+              <a:t>Yeoman</a:t>
+            </a:r>
+            <a:endParaRPr lang="en-US" dirty="0" smtClean="0"/>
           </a:p>
           <a:p>
             <a:pPr marL="0" indent="0">
@@ -16476,8 +16722,13 @@
           <a:p>
             <a:r>
               <a:rPr lang="en-US" dirty="0" smtClean="0"/>
-              <a:t>Tag Helpers</a:t>
-            </a:r>
+              <a:t>Tag </a:t>
+            </a:r>
+            <a:r>
+              <a:rPr lang="en-US" dirty="0" smtClean="0"/>
+              <a:t>Helpers</a:t>
+            </a:r>
+            <a:endParaRPr lang="en-US" dirty="0" smtClean="0"/>
           </a:p>
           <a:p>
             <a:r>
@@ -17299,71 +17550,25 @@
             </a:r>
           </a:p>
           <a:p>
-            <a:pPr lvl="1"/>
             <a:r>
               <a:rPr lang="en-US" dirty="0" smtClean="0"/>
-              <a:t>JavaScript all the things!</a:t>
-            </a:r>
-          </a:p>
-          <a:p>
-            <a:pPr lvl="1"/>
+              <a:t>Code</a:t>
+            </a:r>
             <a:r>
               <a:rPr lang="en-US" dirty="0" smtClean="0"/>
-              <a:t>Tag Helpers</a:t>
-            </a:r>
-          </a:p>
-          <a:p>
-            <a:pPr lvl="1"/>
-            <a:r>
-              <a:rPr lang="en-US" dirty="0" smtClean="0"/>
-              <a:t>View Components</a:t>
-            </a:r>
-          </a:p>
-          <a:p>
-            <a:r>
-              <a:rPr lang="en-US" dirty="0" smtClean="0"/>
-              <a:t>Code!</a:t>
-            </a:r>
-          </a:p>
-          <a:p>
-            <a:pPr lvl="1"/>
-            <a:r>
-              <a:rPr lang="en-US" dirty="0" smtClean="0"/>
-              <a:t>A Brief Tour of ASP.NET MVC 6</a:t>
-            </a:r>
-          </a:p>
-          <a:p>
-            <a:pPr lvl="1"/>
-            <a:r>
-              <a:rPr lang="en-US" dirty="0" smtClean="0"/>
-              <a:t>HTML Helpers</a:t>
-            </a:r>
-          </a:p>
-          <a:p>
-            <a:pPr lvl="1"/>
-            <a:r>
-              <a:rPr lang="en-US" dirty="0" smtClean="0"/>
-              <a:t>Editor and Display Templates</a:t>
-            </a:r>
-          </a:p>
-          <a:p>
-            <a:pPr lvl="1"/>
-            <a:r>
-              <a:rPr lang="en-US" dirty="0" smtClean="0"/>
-              <a:t>View Components</a:t>
-            </a:r>
-          </a:p>
-          <a:p>
-            <a:pPr lvl="1"/>
-            <a:r>
-              <a:rPr lang="en-US" dirty="0" smtClean="0"/>
-              <a:t>Custom Validation</a:t>
-            </a:r>
-          </a:p>
-          <a:p>
+              <a:t>!</a:t>
+            </a:r>
+          </a:p>
+          <a:p>
+            <a:pPr marL="0" indent="0">
+              <a:buNone/>
+            </a:pPr>
             <a:endParaRPr lang="en-US" dirty="0" smtClean="0"/>
           </a:p>
           <a:p>
+            <a:pPr marL="0" indent="0">
+              <a:buNone/>
+            </a:pPr>
             <a:endParaRPr lang="en-US" dirty="0" smtClean="0"/>
           </a:p>
         </p:txBody>
@@ -17496,7 +17701,41 @@
             </a:pPr>
             <a:r>
               <a:rPr lang="en-US" dirty="0" smtClean="0"/>
-              <a:t>To separate the business logic (and validation) from the view. </a:t>
+              <a:t>Model Driven Development</a:t>
+            </a:r>
+            <a:endParaRPr lang="en-US" dirty="0"/>
+          </a:p>
+          <a:p>
+            <a:pPr marL="0" indent="0">
+              <a:buNone/>
+            </a:pPr>
+            <a:r>
+              <a:rPr lang="en-US" dirty="0" smtClean="0"/>
+              <a:t> &gt; </a:t>
+            </a:r>
+            <a:r>
+              <a:rPr lang="en-US" dirty="0"/>
+              <a:t>S</a:t>
+            </a:r>
+            <a:r>
+              <a:rPr lang="en-US" dirty="0" smtClean="0"/>
+              <a:t>eparate business </a:t>
+            </a:r>
+            <a:r>
+              <a:rPr lang="en-US" dirty="0" smtClean="0"/>
+              <a:t>logic </a:t>
+            </a:r>
+            <a:r>
+              <a:rPr lang="en-US" dirty="0" smtClean="0"/>
+              <a:t>(validation</a:t>
+            </a:r>
+            <a:r>
+              <a:rPr lang="en-US" dirty="0" smtClean="0"/>
+              <a:t>) from </a:t>
+            </a:r>
+            <a:r>
+              <a:rPr lang="en-US" dirty="0" smtClean="0"/>
+              <a:t>views and controllers. </a:t>
             </a:r>
             <a:endParaRPr lang="en-US" dirty="0"/>
           </a:p>
@@ -17606,22 +17845,7 @@
             </a:r>
           </a:p>
           <a:p>
-            <a:r>
-              <a:rPr lang="en-US" dirty="0" smtClean="0"/>
-              <a:t>Not </a:t>
-            </a:r>
-            <a:r>
-              <a:rPr lang="en-US" dirty="0"/>
-              <a:t>to have to change the code in 100 different places because </a:t>
-            </a:r>
-            <a:r>
-              <a:rPr lang="en-US" dirty="0" smtClean="0"/>
-              <a:t>you switched </a:t>
-            </a:r>
-            <a:r>
-              <a:rPr lang="en-US" dirty="0"/>
-              <a:t>date pickers. </a:t>
-            </a:r>
+            <a:endParaRPr lang="en-US" dirty="0"/>
           </a:p>
           <a:p>
             <a:pPr marL="0" indent="0">
@@ -17776,7 +18000,11 @@
           <a:p>
             <a:r>
               <a:rPr lang="en-US" dirty="0" smtClean="0"/>
-              <a:t>Really though:</a:t>
+              <a:t>Really though</a:t>
+            </a:r>
+            <a:r>
+              <a:rPr lang="en-US" dirty="0" smtClean="0"/>
+              <a:t>: laziness…</a:t>
             </a:r>
             <a:endParaRPr lang="en-US" dirty="0"/>
           </a:p>
@@ -17859,7 +18087,15 @@
           <a:p>
             <a:r>
               <a:rPr lang="en-US" dirty="0" smtClean="0"/>
-              <a:t>Model, View, Controller, etc… </a:t>
+              <a:t>Model, View, Controller, </a:t>
+            </a:r>
+            <a:r>
+              <a:rPr lang="en-US" dirty="0" smtClean="0"/>
+              <a:t>etc</a:t>
+            </a:r>
+            <a:r>
+              <a:rPr lang="en-US" dirty="0" smtClean="0"/>
+              <a:t>… </a:t>
             </a:r>
             <a:endParaRPr lang="en-US" dirty="0"/>
           </a:p>

</xml_diff>